<commit_message>
more edits to pres2
</commit_message>
<xml_diff>
--- a/Presentation_2/CMPUT631-ProjectProgress-V0P1.pptx
+++ b/Presentation_2/CMPUT631-ProjectProgress-V0P1.pptx
@@ -8139,7 +8139,7 @@
     <p:sldLayoutId id="2147483896" r:id="rId26"/>
     <p:sldLayoutId id="2147483897" r:id="rId27"/>
   </p:sldLayoutIdLst>
-  <p:hf sldNum="0" hdr="0" ftr="0" dt="0"/>
+  <p:hf hdr="0" ftr="0" dt="0"/>
   <p:txStyles>
     <p:titleStyle>
       <a:lvl1pPr algn="ctr" defTabSz="457200" rtl="0" eaLnBrk="1" fontAlgn="base" hangingPunct="1">
@@ -8759,8 +8759,8 @@
         </p:nvSpPr>
         <p:spPr>
           <a:xfrm>
-            <a:off x="2962424" y="2693829"/>
-            <a:ext cx="3219151" cy="400110"/>
+            <a:off x="2849413" y="2745552"/>
+            <a:ext cx="3445174" cy="400110"/>
           </a:xfrm>
           <a:prstGeom prst="rect">
             <a:avLst/>
@@ -8774,9 +8774,9 @@
           <a:lstStyle/>
           <a:p>
             <a:r>
-              <a:rPr lang="en-US" sz="2000" dirty="0">
-                <a:solidFill>
-                  <a:srgbClr val="176238"/>
+              <a:rPr lang="en-US" sz="2000" b="1" dirty="0">
+                <a:solidFill>
+                  <a:srgbClr val="00B050"/>
                 </a:solidFill>
               </a:rPr>
               <a:t>Project Progress Overview</a:t>
@@ -11217,7 +11217,7 @@
           <p:nvPr>
             <p:extLst>
               <p:ext uri="{D42A27DB-BD31-4B8C-83A1-F6EECF244321}">
-                <p14:modId xmlns:p14="http://schemas.microsoft.com/office/powerpoint/2010/main" val="3315108265"/>
+                <p14:modId xmlns:p14="http://schemas.microsoft.com/office/powerpoint/2010/main" val="1163620539"/>
               </p:ext>
             </p:extLst>
           </p:nvPr>
@@ -11458,7 +11458,10 @@
                     <a:lstStyle/>
                     <a:p>
                       <a:pPr algn="ctr"/>
-                      <a:endParaRPr lang="en-US" sz="1400" dirty="0"/>
+                      <a:r>
+                        <a:rPr lang="en-US" sz="1400" dirty="0"/>
+                        <a:t>3.210</a:t>
+                      </a:r>
                     </a:p>
                   </a:txBody>
                   <a:tcPr anchor="ctr"/>
@@ -11469,7 +11472,10 @@
                     <a:lstStyle/>
                     <a:p>
                       <a:pPr algn="ctr"/>
-                      <a:endParaRPr lang="en-US" sz="1400" dirty="0"/>
+                      <a:r>
+                        <a:rPr lang="en-US" sz="1400" dirty="0"/>
+                        <a:t>6.189</a:t>
+                      </a:r>
                     </a:p>
                   </a:txBody>
                   <a:tcPr anchor="ctr"/>
@@ -11480,7 +11486,10 @@
                     <a:lstStyle/>
                     <a:p>
                       <a:pPr algn="ctr"/>
-                      <a:endParaRPr lang="en-US" sz="1400" dirty="0"/>
+                      <a:r>
+                        <a:rPr lang="en-US" sz="1400" dirty="0"/>
+                        <a:t>5.845</a:t>
+                      </a:r>
                     </a:p>
                   </a:txBody>
                   <a:tcPr anchor="ctr"/>
@@ -11491,7 +11500,10 @@
                     <a:lstStyle/>
                     <a:p>
                       <a:pPr algn="ctr"/>
-                      <a:endParaRPr lang="en-US" sz="1400" dirty="0"/>
+                      <a:r>
+                        <a:rPr lang="en-US" sz="1400" dirty="0"/>
+                        <a:t>3.211</a:t>
+                      </a:r>
                     </a:p>
                   </a:txBody>
                   <a:tcPr anchor="ctr"/>
@@ -11502,7 +11514,10 @@
                     <a:lstStyle/>
                     <a:p>
                       <a:pPr algn="ctr"/>
-                      <a:endParaRPr lang="en-US" sz="1400" dirty="0"/>
+                      <a:r>
+                        <a:rPr lang="en-US" sz="1400" dirty="0"/>
+                        <a:t>0.092</a:t>
+                      </a:r>
                     </a:p>
                   </a:txBody>
                   <a:tcPr anchor="ctr"/>
@@ -11513,7 +11528,10 @@
                     <a:lstStyle/>
                     <a:p>
                       <a:pPr algn="ctr"/>
-                      <a:endParaRPr lang="en-US" sz="1400" dirty="0"/>
+                      <a:r>
+                        <a:rPr lang="en-US" sz="1400" dirty="0"/>
+                        <a:t>12.426</a:t>
+                      </a:r>
                     </a:p>
                   </a:txBody>
                   <a:tcPr anchor="ctr"/>
@@ -11569,7 +11587,10 @@
                     <a:lstStyle/>
                     <a:p>
                       <a:pPr algn="ctr"/>
-                      <a:endParaRPr lang="en-US" sz="1400" dirty="0"/>
+                      <a:r>
+                        <a:rPr lang="en-US" sz="1400" dirty="0"/>
+                        <a:t>2.964</a:t>
+                      </a:r>
                     </a:p>
                   </a:txBody>
                   <a:tcPr anchor="ctr">
@@ -11590,7 +11611,10 @@
                     <a:lstStyle/>
                     <a:p>
                       <a:pPr algn="ctr"/>
-                      <a:endParaRPr lang="en-US" sz="1400" dirty="0"/>
+                      <a:r>
+                        <a:rPr lang="en-US" sz="1400" dirty="0"/>
+                        <a:t>5.850</a:t>
+                      </a:r>
                     </a:p>
                   </a:txBody>
                   <a:tcPr anchor="ctr">
@@ -11611,7 +11635,10 @@
                     <a:lstStyle/>
                     <a:p>
                       <a:pPr algn="ctr"/>
-                      <a:endParaRPr lang="en-US" sz="1400" dirty="0"/>
+                      <a:r>
+                        <a:rPr lang="en-US" sz="1400" dirty="0"/>
+                        <a:t>5.865</a:t>
+                      </a:r>
                     </a:p>
                   </a:txBody>
                   <a:tcPr anchor="ctr">
@@ -11632,7 +11659,10 @@
                     <a:lstStyle/>
                     <a:p>
                       <a:pPr algn="ctr"/>
-                      <a:endParaRPr lang="en-US" sz="1400" dirty="0"/>
+                      <a:r>
+                        <a:rPr lang="en-US" sz="1400" dirty="0"/>
+                        <a:t>2.965</a:t>
+                      </a:r>
                     </a:p>
                   </a:txBody>
                   <a:tcPr anchor="ctr">
@@ -11653,7 +11683,10 @@
                     <a:lstStyle/>
                     <a:p>
                       <a:pPr algn="ctr"/>
-                      <a:endParaRPr lang="en-US" sz="1400" dirty="0"/>
+                      <a:r>
+                        <a:rPr lang="en-US" sz="1400" dirty="0"/>
+                        <a:t>0.131</a:t>
+                      </a:r>
                     </a:p>
                   </a:txBody>
                   <a:tcPr anchor="ctr">
@@ -11674,7 +11707,10 @@
                     <a:lstStyle/>
                     <a:p>
                       <a:pPr algn="ctr"/>
-                      <a:endParaRPr lang="en-US" sz="1400" dirty="0"/>
+                      <a:r>
+                        <a:rPr lang="en-US" sz="1400" dirty="0"/>
+                        <a:t>11.486</a:t>
+                      </a:r>
                     </a:p>
                   </a:txBody>
                   <a:tcPr anchor="ctr">
@@ -11784,7 +11820,10 @@
                     <a:lstStyle/>
                     <a:p>
                       <a:pPr algn="ctr"/>
-                      <a:endParaRPr lang="en-US" sz="1400" dirty="0"/>
+                      <a:r>
+                        <a:rPr lang="en-US" sz="1400" dirty="0"/>
+                        <a:t>6.476</a:t>
+                      </a:r>
                     </a:p>
                   </a:txBody>
                   <a:tcPr anchor="ctr">
@@ -11805,7 +11844,10 @@
                     <a:lstStyle/>
                     <a:p>
                       <a:pPr algn="ctr"/>
-                      <a:endParaRPr lang="en-US" sz="1400" dirty="0"/>
+                      <a:r>
+                        <a:rPr lang="en-US" sz="1400" dirty="0"/>
+                        <a:t>10.329</a:t>
+                      </a:r>
                     </a:p>
                   </a:txBody>
                   <a:tcPr anchor="ctr">
@@ -11826,7 +11868,10 @@
                     <a:lstStyle/>
                     <a:p>
                       <a:pPr algn="ctr"/>
-                      <a:endParaRPr lang="en-US" sz="1400" dirty="0"/>
+                      <a:r>
+                        <a:rPr lang="en-US" sz="1400" dirty="0"/>
+                        <a:t>10.190</a:t>
+                      </a:r>
                     </a:p>
                   </a:txBody>
                   <a:tcPr anchor="ctr">
@@ -11847,7 +11892,10 @@
                     <a:lstStyle/>
                     <a:p>
                       <a:pPr algn="ctr"/>
-                      <a:endParaRPr lang="en-US" sz="1400" dirty="0"/>
+                      <a:r>
+                        <a:rPr lang="en-US" sz="1400" dirty="0"/>
+                        <a:t>6.488</a:t>
+                      </a:r>
                     </a:p>
                   </a:txBody>
                   <a:tcPr anchor="ctr">
@@ -11868,7 +11916,10 @@
                     <a:lstStyle/>
                     <a:p>
                       <a:pPr algn="ctr"/>
-                      <a:endParaRPr lang="en-US" sz="1400" dirty="0"/>
+                      <a:r>
+                        <a:rPr lang="en-US" sz="1400" dirty="0"/>
+                        <a:t>0.096</a:t>
+                      </a:r>
                     </a:p>
                   </a:txBody>
                   <a:tcPr anchor="ctr">
@@ -11889,7 +11940,10 @@
                     <a:lstStyle/>
                     <a:p>
                       <a:pPr algn="ctr"/>
-                      <a:endParaRPr lang="en-US" sz="1400" dirty="0"/>
+                      <a:r>
+                        <a:rPr lang="en-US" sz="1400" dirty="0"/>
+                        <a:t>21.573</a:t>
+                      </a:r>
                     </a:p>
                   </a:txBody>
                   <a:tcPr anchor="ctr">
@@ -11955,7 +12009,10 @@
                     <a:lstStyle/>
                     <a:p>
                       <a:pPr algn="ctr"/>
-                      <a:endParaRPr lang="en-US" sz="1400" dirty="0"/>
+                      <a:r>
+                        <a:rPr lang="en-US" sz="1400" dirty="0"/>
+                        <a:t>4.623</a:t>
+                      </a:r>
                     </a:p>
                   </a:txBody>
                   <a:tcPr anchor="ctr">
@@ -11976,7 +12033,10 @@
                     <a:lstStyle/>
                     <a:p>
                       <a:pPr algn="ctr"/>
-                      <a:endParaRPr lang="en-US" sz="1400" dirty="0"/>
+                      <a:r>
+                        <a:rPr lang="en-US" sz="1400" dirty="0"/>
+                        <a:t>7.709</a:t>
+                      </a:r>
                     </a:p>
                   </a:txBody>
                   <a:tcPr anchor="ctr">
@@ -11997,7 +12057,10 @@
                     <a:lstStyle/>
                     <a:p>
                       <a:pPr algn="ctr"/>
-                      <a:endParaRPr lang="en-US" sz="1400" dirty="0"/>
+                      <a:r>
+                        <a:rPr lang="en-US" sz="1400" dirty="0"/>
+                        <a:t>7.690</a:t>
+                      </a:r>
                     </a:p>
                   </a:txBody>
                   <a:tcPr anchor="ctr">
@@ -12018,7 +12081,10 @@
                     <a:lstStyle/>
                     <a:p>
                       <a:pPr algn="ctr"/>
-                      <a:endParaRPr lang="en-US" sz="1400" dirty="0"/>
+                      <a:r>
+                        <a:rPr lang="en-US" sz="1400" dirty="0"/>
+                        <a:t>4.631</a:t>
+                      </a:r>
                     </a:p>
                   </a:txBody>
                   <a:tcPr anchor="ctr">
@@ -12039,7 +12105,10 @@
                     <a:lstStyle/>
                     <a:p>
                       <a:pPr algn="ctr"/>
-                      <a:endParaRPr lang="en-US" sz="1400" dirty="0"/>
+                      <a:r>
+                        <a:rPr lang="en-US" sz="1400" dirty="0"/>
+                        <a:t>0.049</a:t>
+                      </a:r>
                     </a:p>
                   </a:txBody>
                   <a:tcPr anchor="ctr">
@@ -12060,7 +12129,10 @@
                     <a:lstStyle/>
                     <a:p>
                       <a:pPr algn="ctr"/>
-                      <a:endParaRPr lang="en-US" sz="1400" dirty="0"/>
+                      <a:r>
+                        <a:rPr lang="en-US" sz="1400" dirty="0"/>
+                        <a:t>14.979</a:t>
+                      </a:r>
                     </a:p>
                   </a:txBody>
                   <a:tcPr anchor="ctr">
@@ -12156,7 +12228,10 @@
                     <a:lstStyle/>
                     <a:p>
                       <a:pPr algn="ctr"/>
-                      <a:endParaRPr lang="en-US" sz="1400" dirty="0"/>
+                      <a:r>
+                        <a:rPr lang="en-US" sz="1400" dirty="0"/>
+                        <a:t>1.868</a:t>
+                      </a:r>
                     </a:p>
                   </a:txBody>
                   <a:tcPr anchor="ctr">
@@ -12177,7 +12252,10 @@
                     <a:lstStyle/>
                     <a:p>
                       <a:pPr algn="ctr"/>
-                      <a:endParaRPr lang="en-US" sz="1400" dirty="0"/>
+                      <a:r>
+                        <a:rPr lang="en-US" sz="1400" dirty="0"/>
+                        <a:t>3.705</a:t>
+                      </a:r>
                     </a:p>
                   </a:txBody>
                   <a:tcPr anchor="ctr">
@@ -12198,7 +12276,10 @@
                     <a:lstStyle/>
                     <a:p>
                       <a:pPr algn="ctr"/>
-                      <a:endParaRPr lang="en-US" sz="1400" dirty="0"/>
+                      <a:r>
+                        <a:rPr lang="en-US" sz="1400" dirty="0"/>
+                        <a:t>3.600</a:t>
+                      </a:r>
                     </a:p>
                   </a:txBody>
                   <a:tcPr anchor="ctr">
@@ -12219,7 +12300,10 @@
                     <a:lstStyle/>
                     <a:p>
                       <a:pPr algn="ctr"/>
-                      <a:endParaRPr lang="en-US" sz="1400" dirty="0"/>
+                      <a:r>
+                        <a:rPr lang="en-US" sz="1400" dirty="0"/>
+                        <a:t>1.869</a:t>
+                      </a:r>
                     </a:p>
                   </a:txBody>
                   <a:tcPr anchor="ctr">
@@ -12240,7 +12324,10 @@
                     <a:lstStyle/>
                     <a:p>
                       <a:pPr algn="ctr"/>
-                      <a:endParaRPr lang="en-US" sz="1400" dirty="0"/>
+                      <a:r>
+                        <a:rPr lang="en-US" sz="1400" dirty="0"/>
+                        <a:t>0.024</a:t>
+                      </a:r>
                     </a:p>
                   </a:txBody>
                   <a:tcPr anchor="ctr">
@@ -12261,7 +12348,10 @@
                     <a:lstStyle/>
                     <a:p>
                       <a:pPr algn="ctr"/>
-                      <a:endParaRPr lang="en-US" sz="1400" dirty="0"/>
+                      <a:r>
+                        <a:rPr lang="en-US" sz="1400" dirty="0"/>
+                        <a:t>7.171</a:t>
+                      </a:r>
                     </a:p>
                   </a:txBody>
                   <a:tcPr anchor="ctr">
@@ -12317,7 +12407,10 @@
                     <a:lstStyle/>
                     <a:p>
                       <a:pPr algn="ctr"/>
-                      <a:endParaRPr lang="en-US" sz="1400" dirty="0"/>
+                      <a:r>
+                        <a:rPr lang="en-US" sz="1400" dirty="0"/>
+                        <a:t>0.807</a:t>
+                      </a:r>
                     </a:p>
                   </a:txBody>
                   <a:tcPr anchor="ctr"/>
@@ -12328,7 +12421,10 @@
                     <a:lstStyle/>
                     <a:p>
                       <a:pPr algn="ctr"/>
-                      <a:endParaRPr lang="en-US" sz="1400" dirty="0"/>
+                      <a:r>
+                        <a:rPr lang="en-US" sz="1400" dirty="0"/>
+                        <a:t>2.162</a:t>
+                      </a:r>
                     </a:p>
                   </a:txBody>
                   <a:tcPr anchor="ctr"/>
@@ -12339,7 +12435,10 @@
                     <a:lstStyle/>
                     <a:p>
                       <a:pPr algn="ctr"/>
-                      <a:endParaRPr lang="en-US" sz="1400" dirty="0"/>
+                      <a:r>
+                        <a:rPr lang="en-US" sz="1400" dirty="0"/>
+                        <a:t>2.170</a:t>
+                      </a:r>
                     </a:p>
                   </a:txBody>
                   <a:tcPr anchor="ctr"/>
@@ -12350,7 +12449,10 @@
                     <a:lstStyle/>
                     <a:p>
                       <a:pPr algn="ctr"/>
-                      <a:endParaRPr lang="en-US" sz="1400" dirty="0"/>
+                      <a:r>
+                        <a:rPr lang="en-US" sz="1400" dirty="0"/>
+                        <a:t>0.807</a:t>
+                      </a:r>
                     </a:p>
                   </a:txBody>
                   <a:tcPr anchor="ctr"/>
@@ -12361,7 +12463,10 @@
                     <a:lstStyle/>
                     <a:p>
                       <a:pPr algn="ctr"/>
-                      <a:endParaRPr lang="en-US" sz="1400" dirty="0"/>
+                      <a:r>
+                        <a:rPr lang="en-US" sz="1400" dirty="0"/>
+                        <a:t>0.012</a:t>
+                      </a:r>
                     </a:p>
                   </a:txBody>
                   <a:tcPr anchor="ctr"/>
@@ -12372,7 +12477,10 @@
                     <a:lstStyle/>
                     <a:p>
                       <a:pPr algn="ctr"/>
-                      <a:endParaRPr lang="en-US" sz="1400" dirty="0"/>
+                      <a:r>
+                        <a:rPr lang="en-US" sz="1400" dirty="0"/>
+                        <a:t>3.784</a:t>
+                      </a:r>
                     </a:p>
                   </a:txBody>
                   <a:tcPr anchor="ctr"/>
@@ -12488,7 +12596,7 @@
               <a:buAutoNum type="arabicPeriod"/>
             </a:pPr>
             <a:r>
-              <a:rPr lang="en-US" dirty="0"/>
+              <a:rPr lang="en-US" b="0" dirty="0"/>
               <a:t>ORB-SLAM2 generates sparse maps (point clouds), would this be sufficient for RTAB-Map to utilize in its operation?</a:t>
             </a:r>
           </a:p>
@@ -12497,7 +12605,7 @@
               <a:buFont typeface="+mj-lt"/>
               <a:buAutoNum type="arabicPeriod"/>
             </a:pPr>
-            <a:endParaRPr lang="en-US" dirty="0"/>
+            <a:endParaRPr lang="en-US" sz="800" b="0" dirty="0"/>
           </a:p>
           <a:p>
             <a:pPr marL="457200" indent="-457200">
@@ -12505,16 +12613,8 @@
               <a:buAutoNum type="arabicPeriod"/>
             </a:pPr>
             <a:r>
-              <a:rPr lang="en-US" dirty="0"/>
-              <a:t>Are </a:t>
-            </a:r>
-            <a:r>
-              <a:rPr lang="en-US" dirty="0" err="1"/>
-              <a:t>Kitti</a:t>
-            </a:r>
-            <a:r>
-              <a:rPr lang="en-US" dirty="0"/>
-              <a:t> (Stereo) and TUM (RGB-D) enough to evaluate the system and to explore its corner cases?</a:t>
+              <a:rPr lang="en-US" b="0" dirty="0"/>
+              <a:t>Is the synchronization block in RTAB-Map enough to handle the synchronization between input images and point cloud?</a:t>
             </a:r>
           </a:p>
           <a:p>
@@ -12522,7 +12622,7 @@
               <a:buFont typeface="+mj-lt"/>
               <a:buAutoNum type="arabicPeriod"/>
             </a:pPr>
-            <a:endParaRPr lang="en-US" dirty="0"/>
+            <a:endParaRPr lang="en-US" sz="800" b="0" dirty="0"/>
           </a:p>
           <a:p>
             <a:pPr marL="457200" indent="-457200">
@@ -12530,7 +12630,24 @@
               <a:buAutoNum type="arabicPeriod"/>
             </a:pPr>
             <a:r>
-              <a:rPr lang="en-US" dirty="0"/>
+              <a:rPr lang="en-US" b="0" dirty="0"/>
+              <a:t>Are KITTI (Stereo) and TUM (RGB-D) enough to evaluate the system and to explore its corner cases?</a:t>
+            </a:r>
+          </a:p>
+          <a:p>
+            <a:pPr marL="457200" indent="-457200">
+              <a:buFont typeface="+mj-lt"/>
+              <a:buAutoNum type="arabicPeriod"/>
+            </a:pPr>
+            <a:endParaRPr lang="en-US" sz="800" b="0" dirty="0"/>
+          </a:p>
+          <a:p>
+            <a:pPr marL="457200" indent="-457200">
+              <a:buFont typeface="+mj-lt"/>
+              <a:buAutoNum type="arabicPeriod"/>
+            </a:pPr>
+            <a:r>
+              <a:rPr lang="en-US" b="0" dirty="0"/>
               <a:t>TUM Dataset, is the lack of distortion is the reason behind the degraded performance in freiburg2 sequences?</a:t>
             </a:r>
           </a:p>
@@ -13059,7 +13176,96 @@
           <a:bodyPr/>
           <a:lstStyle/>
           <a:p>
-            <a:endParaRPr lang="en-US"/>
+            <a:pPr marL="342900" indent="-342900">
+              <a:buFont typeface="Arial" panose="020B0604020202020204" pitchFamily="34" charset="0"/>
+              <a:buChar char="•"/>
+            </a:pPr>
+            <a:r>
+              <a:rPr lang="en-US" dirty="0"/>
+              <a:t>In this presentation, we discuss the </a:t>
+            </a:r>
+            <a:r>
+              <a:rPr lang="en-US" dirty="0">
+                <a:solidFill>
+                  <a:srgbClr val="00B050"/>
+                </a:solidFill>
+              </a:rPr>
+              <a:t>details of both ORB-SLAM2 and RTAB-Map</a:t>
+            </a:r>
+            <a:r>
+              <a:rPr lang="en-US" dirty="0"/>
+              <a:t> as well as </a:t>
+            </a:r>
+            <a:r>
+              <a:rPr lang="en-US" dirty="0">
+                <a:solidFill>
+                  <a:srgbClr val="00B050"/>
+                </a:solidFill>
+              </a:rPr>
+              <a:t>the integration details between the two</a:t>
+            </a:r>
+            <a:r>
+              <a:rPr lang="en-US" dirty="0"/>
+              <a:t>. </a:t>
+            </a:r>
+          </a:p>
+          <a:p>
+            <a:pPr marL="342900" indent="-342900">
+              <a:buFont typeface="Arial" panose="020B0604020202020204" pitchFamily="34" charset="0"/>
+              <a:buChar char="•"/>
+            </a:pPr>
+            <a:endParaRPr lang="en-US" dirty="0"/>
+          </a:p>
+          <a:p>
+            <a:pPr marL="342900" indent="-342900">
+              <a:buFont typeface="Arial" panose="020B0604020202020204" pitchFamily="34" charset="0"/>
+              <a:buChar char="•"/>
+            </a:pPr>
+            <a:r>
+              <a:rPr lang="en-US" dirty="0"/>
+              <a:t>Additionally, we present some of the </a:t>
+            </a:r>
+            <a:r>
+              <a:rPr lang="en-US" dirty="0">
+                <a:solidFill>
+                  <a:srgbClr val="00B050"/>
+                </a:solidFill>
+              </a:rPr>
+              <a:t>baseline results and discuss their indications</a:t>
+            </a:r>
+            <a:r>
+              <a:rPr lang="en-US" dirty="0"/>
+              <a:t>. </a:t>
+            </a:r>
+          </a:p>
+          <a:p>
+            <a:pPr marL="342900" indent="-342900">
+              <a:buFont typeface="Arial" panose="020B0604020202020204" pitchFamily="34" charset="0"/>
+              <a:buChar char="•"/>
+            </a:pPr>
+            <a:endParaRPr lang="en-US" dirty="0"/>
+          </a:p>
+          <a:p>
+            <a:pPr marL="342900" indent="-342900">
+              <a:buFont typeface="Arial" panose="020B0604020202020204" pitchFamily="34" charset="0"/>
+              <a:buChar char="•"/>
+            </a:pPr>
+            <a:r>
+              <a:rPr lang="en-US" dirty="0"/>
+              <a:t>Finally, we conclude with some </a:t>
+            </a:r>
+            <a:r>
+              <a:rPr lang="en-US" dirty="0">
+                <a:solidFill>
+                  <a:srgbClr val="00B050"/>
+                </a:solidFill>
+              </a:rPr>
+              <a:t>open questions </a:t>
+            </a:r>
+            <a:r>
+              <a:rPr lang="en-US" dirty="0"/>
+              <a:t>that are yet to be answered in the course of the project. </a:t>
+            </a:r>
           </a:p>
         </p:txBody>
       </p:sp>
@@ -13318,7 +13524,7 @@
           <a:bodyPr/>
           <a:lstStyle/>
           <a:p>
-            <a:endParaRPr lang="en-US"/>
+            <a:endParaRPr lang="en-US" dirty="0"/>
           </a:p>
         </p:txBody>
       </p:sp>
@@ -13401,7 +13607,156 @@
           <a:bodyPr/>
           <a:lstStyle/>
           <a:p>
-            <a:endParaRPr lang="en-US"/>
+            <a:pPr marL="342900" indent="-342900">
+              <a:buFont typeface="Arial" panose="020B0604020202020204" pitchFamily="34" charset="0"/>
+              <a:buChar char="•"/>
+            </a:pPr>
+            <a:r>
+              <a:rPr lang="en-US" dirty="0"/>
+              <a:t>Both </a:t>
+            </a:r>
+            <a:r>
+              <a:rPr lang="en-US" dirty="0">
+                <a:solidFill>
+                  <a:srgbClr val="00B050"/>
+                </a:solidFill>
+              </a:rPr>
+              <a:t>ORB-SLAM2</a:t>
+            </a:r>
+            <a:r>
+              <a:rPr lang="en-US" dirty="0"/>
+              <a:t> and </a:t>
+            </a:r>
+            <a:r>
+              <a:rPr lang="en-US" dirty="0">
+                <a:solidFill>
+                  <a:srgbClr val="00B050"/>
+                </a:solidFill>
+              </a:rPr>
+              <a:t>RTAB-Map</a:t>
+            </a:r>
+            <a:r>
+              <a:rPr lang="en-US" dirty="0"/>
+              <a:t> are state-of-the-art SLAM algorithms </a:t>
+            </a:r>
+            <a:r>
+              <a:rPr lang="en-US" dirty="0">
+                <a:solidFill>
+                  <a:srgbClr val="00B050"/>
+                </a:solidFill>
+              </a:rPr>
+              <a:t>but each has performance issues under certain conditions</a:t>
+            </a:r>
+            <a:r>
+              <a:rPr lang="en-US" dirty="0"/>
+              <a:t> due to </a:t>
+            </a:r>
+            <a:r>
+              <a:rPr lang="en-US" dirty="0">
+                <a:solidFill>
+                  <a:srgbClr val="00B050"/>
+                </a:solidFill>
+              </a:rPr>
+              <a:t>its architecture</a:t>
+            </a:r>
+            <a:r>
+              <a:rPr lang="en-US" dirty="0"/>
+              <a:t>. </a:t>
+            </a:r>
+          </a:p>
+          <a:p>
+            <a:pPr marL="342900" indent="-342900">
+              <a:buFont typeface="Arial" panose="020B0604020202020204" pitchFamily="34" charset="0"/>
+              <a:buChar char="•"/>
+            </a:pPr>
+            <a:endParaRPr lang="en-US" dirty="0"/>
+          </a:p>
+          <a:p>
+            <a:pPr marL="342900" indent="-342900">
+              <a:buFont typeface="Arial" panose="020B0604020202020204" pitchFamily="34" charset="0"/>
+              <a:buChar char="•"/>
+            </a:pPr>
+            <a:r>
+              <a:rPr lang="en-US" dirty="0"/>
+              <a:t>ORB-SLAM2 optimizes </a:t>
+            </a:r>
+            <a:r>
+              <a:rPr lang="en-US" dirty="0">
+                <a:solidFill>
+                  <a:srgbClr val="00B050"/>
+                </a:solidFill>
+              </a:rPr>
+              <a:t>both camera poses and map points </a:t>
+            </a:r>
+            <a:r>
+              <a:rPr lang="en-US" dirty="0"/>
+              <a:t>(2 levels of optimization) while RTAB-Map only optimize</a:t>
+            </a:r>
+            <a:r>
+              <a:rPr lang="en-US" dirty="0">
+                <a:solidFill>
+                  <a:srgbClr val="00B050"/>
+                </a:solidFill>
+              </a:rPr>
+              <a:t> camera poses</a:t>
+            </a:r>
+            <a:r>
+              <a:rPr lang="en-US" dirty="0"/>
+              <a:t>.</a:t>
+            </a:r>
+          </a:p>
+          <a:p>
+            <a:pPr marL="342900" indent="-342900">
+              <a:buFont typeface="Arial" panose="020B0604020202020204" pitchFamily="34" charset="0"/>
+              <a:buChar char="•"/>
+            </a:pPr>
+            <a:endParaRPr lang="en-US" dirty="0"/>
+          </a:p>
+          <a:p>
+            <a:pPr marL="342900" indent="-342900">
+              <a:buFont typeface="Arial" panose="020B0604020202020204" pitchFamily="34" charset="0"/>
+              <a:buChar char="•"/>
+            </a:pPr>
+            <a:r>
+              <a:rPr lang="en-US" dirty="0"/>
+              <a:t>Integration</a:t>
+            </a:r>
+            <a:r>
+              <a:rPr lang="en-US" dirty="0">
+                <a:solidFill>
+                  <a:srgbClr val="00B050"/>
+                </a:solidFill>
+              </a:rPr>
+              <a:t> </a:t>
+            </a:r>
+            <a:r>
+              <a:rPr lang="en-US" dirty="0"/>
+              <a:t>of both algorithms can yield </a:t>
+            </a:r>
+            <a:r>
+              <a:rPr lang="en-US" dirty="0">
+                <a:solidFill>
+                  <a:srgbClr val="00B050"/>
+                </a:solidFill>
+              </a:rPr>
+              <a:t>more reliable solution</a:t>
+            </a:r>
+            <a:r>
+              <a:rPr lang="en-US" dirty="0"/>
+              <a:t> and can achieve </a:t>
+            </a:r>
+            <a:r>
+              <a:rPr lang="en-US" dirty="0">
+                <a:solidFill>
+                  <a:srgbClr val="00B050"/>
+                </a:solidFill>
+              </a:rPr>
+              <a:t>better performance under wider range of scenarios</a:t>
+            </a:r>
+            <a:r>
+              <a:rPr lang="en-US" dirty="0"/>
+              <a:t>. </a:t>
+            </a:r>
           </a:p>
         </p:txBody>
       </p:sp>
@@ -13490,7 +13845,61 @@
           <a:bodyPr/>
           <a:lstStyle/>
           <a:p>
-            <a:endParaRPr lang="en-US"/>
+            <a:pPr marL="342900" indent="-342900">
+              <a:buFont typeface="Arial" panose="020B0604020202020204" pitchFamily="34" charset="0"/>
+              <a:buChar char="•"/>
+            </a:pPr>
+            <a:r>
+              <a:rPr lang="en-US" dirty="0"/>
+              <a:t>In a nutshell, we are trying to </a:t>
+            </a:r>
+            <a:r>
+              <a:rPr lang="en-US" dirty="0">
+                <a:solidFill>
+                  <a:srgbClr val="00B050"/>
+                </a:solidFill>
+              </a:rPr>
+              <a:t>utilize the optimized map points from ORB-SLAM2</a:t>
+            </a:r>
+            <a:r>
+              <a:rPr lang="en-US" dirty="0"/>
+              <a:t> in RTAB-Map in order to </a:t>
+            </a:r>
+            <a:r>
+              <a:rPr lang="en-US" dirty="0">
+                <a:solidFill>
+                  <a:srgbClr val="00B050"/>
+                </a:solidFill>
+              </a:rPr>
+              <a:t>enhance its accuracy.</a:t>
+            </a:r>
+          </a:p>
+          <a:p>
+            <a:pPr marL="342900" indent="-342900">
+              <a:buFont typeface="Arial" panose="020B0604020202020204" pitchFamily="34" charset="0"/>
+              <a:buChar char="•"/>
+            </a:pPr>
+            <a:r>
+              <a:rPr lang="en-US" dirty="0">
+                <a:solidFill>
+                  <a:srgbClr val="00B050"/>
+                </a:solidFill>
+              </a:rPr>
+              <a:t>Input controls are dependent on the dataset under test </a:t>
+            </a:r>
+            <a:r>
+              <a:rPr lang="en-US" dirty="0"/>
+              <a:t>(DUT) and is sent to both ORB-SLAM2 and RTAB-Map. </a:t>
+            </a:r>
+            <a:r>
+              <a:rPr lang="en-US" dirty="0">
+                <a:solidFill>
+                  <a:srgbClr val="00B050"/>
+                </a:solidFill>
+              </a:rPr>
+              <a:t> </a:t>
+            </a:r>
+            <a:endParaRPr lang="en-US" dirty="0"/>
           </a:p>
         </p:txBody>
       </p:sp>
@@ -13527,6 +13936,36 @@
           </a:p>
         </p:txBody>
       </p:sp>
+      <p:pic>
+        <p:nvPicPr>
+          <p:cNvPr id="5" name="Picture 4">
+            <a:extLst>
+              <a:ext uri="{FF2B5EF4-FFF2-40B4-BE49-F238E27FC236}">
+                <a16:creationId xmlns:a16="http://schemas.microsoft.com/office/drawing/2014/main" id="{A6E1A9E5-3025-4E18-903B-545394D28264}"/>
+              </a:ext>
+            </a:extLst>
+          </p:cNvPr>
+          <p:cNvPicPr>
+            <a:picLocks noChangeAspect="1"/>
+          </p:cNvPicPr>
+          <p:nvPr/>
+        </p:nvPicPr>
+        <p:blipFill>
+          <a:blip r:embed="rId2"/>
+          <a:stretch>
+            <a:fillRect/>
+          </a:stretch>
+        </p:blipFill>
+        <p:spPr>
+          <a:xfrm>
+            <a:off x="0" y="3564922"/>
+            <a:ext cx="9144000" cy="3055556"/>
+          </a:xfrm>
+          <a:prstGeom prst="rect">
+            <a:avLst/>
+          </a:prstGeom>
+        </p:spPr>
+      </p:pic>
     </p:spTree>
     <p:extLst>
       <p:ext uri="{BB962C8B-B14F-4D97-AF65-F5344CB8AC3E}">

</xml_diff>

<commit_message>
finishing the second part of pres2
</commit_message>
<xml_diff>
--- a/Presentation_2/CMPUT631-ProjectProgress-V0P1.pptx
+++ b/Presentation_2/CMPUT631-ProjectProgress-V0P1.pptx
@@ -5,10 +5,10 @@
     <p:sldMasterId id="2147483648" r:id="rId1"/>
   </p:sldMasterIdLst>
   <p:notesMasterIdLst>
-    <p:notesMasterId r:id="rId20"/>
+    <p:notesMasterId r:id="rId26"/>
   </p:notesMasterIdLst>
   <p:handoutMasterIdLst>
-    <p:handoutMasterId r:id="rId21"/>
+    <p:handoutMasterId r:id="rId27"/>
   </p:handoutMasterIdLst>
   <p:sldIdLst>
     <p:sldId id="256" r:id="rId2"/>
@@ -17,18 +17,24 @@
     <p:sldId id="275" r:id="rId5"/>
     <p:sldId id="276" r:id="rId6"/>
     <p:sldId id="277" r:id="rId7"/>
-    <p:sldId id="278" r:id="rId8"/>
-    <p:sldId id="279" r:id="rId9"/>
-    <p:sldId id="267" r:id="rId10"/>
-    <p:sldId id="268" r:id="rId11"/>
-    <p:sldId id="269" r:id="rId12"/>
-    <p:sldId id="270" r:id="rId13"/>
-    <p:sldId id="272" r:id="rId14"/>
-    <p:sldId id="273" r:id="rId15"/>
-    <p:sldId id="271" r:id="rId16"/>
-    <p:sldId id="266" r:id="rId17"/>
-    <p:sldId id="264" r:id="rId18"/>
-    <p:sldId id="265" r:id="rId19"/>
+    <p:sldId id="280" r:id="rId8"/>
+    <p:sldId id="281" r:id="rId9"/>
+    <p:sldId id="282" r:id="rId10"/>
+    <p:sldId id="283" r:id="rId11"/>
+    <p:sldId id="284" r:id="rId12"/>
+    <p:sldId id="285" r:id="rId13"/>
+    <p:sldId id="278" r:id="rId14"/>
+    <p:sldId id="279" r:id="rId15"/>
+    <p:sldId id="267" r:id="rId16"/>
+    <p:sldId id="268" r:id="rId17"/>
+    <p:sldId id="269" r:id="rId18"/>
+    <p:sldId id="270" r:id="rId19"/>
+    <p:sldId id="272" r:id="rId20"/>
+    <p:sldId id="273" r:id="rId21"/>
+    <p:sldId id="271" r:id="rId22"/>
+    <p:sldId id="266" r:id="rId23"/>
+    <p:sldId id="264" r:id="rId24"/>
+    <p:sldId id="265" r:id="rId25"/>
   </p:sldIdLst>
   <p:sldSz cx="9144000" cy="6858000" type="screen4x3"/>
   <p:notesSz cx="6858000" cy="9144000"/>
@@ -8811,6 +8817,1166 @@
       </p:grpSpPr>
       <p:sp>
         <p:nvSpPr>
+          <p:cNvPr id="2" name="Text Placeholder 1">
+            <a:extLst>
+              <a:ext uri="{FF2B5EF4-FFF2-40B4-BE49-F238E27FC236}">
+                <a16:creationId xmlns:a16="http://schemas.microsoft.com/office/drawing/2014/main" id="{D72E0B0E-2E5F-4BB3-95A9-40BD5F1F3929}"/>
+              </a:ext>
+            </a:extLst>
+          </p:cNvPr>
+          <p:cNvSpPr>
+            <a:spLocks noGrp="1"/>
+          </p:cNvSpPr>
+          <p:nvPr>
+            <p:ph type="body" sz="quarter" idx="16"/>
+          </p:nvPr>
+        </p:nvSpPr>
+        <p:spPr/>
+        <p:txBody>
+          <a:bodyPr/>
+          <a:lstStyle/>
+          <a:p>
+            <a:pPr marL="342900" indent="-342900">
+              <a:buFont typeface="Arial" panose="020B0604020202020204" pitchFamily="34" charset="0"/>
+              <a:buChar char="•"/>
+            </a:pPr>
+            <a:r>
+              <a:rPr lang="en-US" dirty="0"/>
+              <a:t>Key Findings:</a:t>
+            </a:r>
+            <a:endParaRPr lang="en-US" b="0" dirty="0"/>
+          </a:p>
+          <a:p>
+            <a:pPr marL="685800" lvl="1" indent="-342900">
+              <a:buFont typeface="Arial" panose="020B0604020202020204" pitchFamily="34" charset="0"/>
+              <a:buChar char="•"/>
+            </a:pPr>
+            <a:r>
+              <a:rPr lang="en-US" b="0" dirty="0"/>
+              <a:t>ORB-SLAM point cloud is very sparse and has very little details.</a:t>
+            </a:r>
+          </a:p>
+          <a:p>
+            <a:pPr marL="685800" lvl="1" indent="-342900">
+              <a:buFont typeface="Arial" panose="020B0604020202020204" pitchFamily="34" charset="0"/>
+              <a:buChar char="•"/>
+            </a:pPr>
+            <a:r>
+              <a:rPr lang="en-US" b="0" dirty="0"/>
+              <a:t>ORB-SLAM created less amount of outliers.</a:t>
+            </a:r>
+          </a:p>
+          <a:p>
+            <a:pPr marL="685800" lvl="1" indent="-342900">
+              <a:buFont typeface="Arial" panose="020B0604020202020204" pitchFamily="34" charset="0"/>
+              <a:buChar char="•"/>
+            </a:pPr>
+            <a:r>
+              <a:rPr lang="en-US" b="0" dirty="0"/>
+              <a:t>RTAB-Map created a dense point cloud with a small number of outliers but greater than ORB-SLAM</a:t>
+            </a:r>
+          </a:p>
+          <a:p>
+            <a:pPr marL="685800" lvl="1" indent="-342900">
+              <a:buFont typeface="Arial" panose="020B0604020202020204" pitchFamily="34" charset="0"/>
+              <a:buChar char="•"/>
+            </a:pPr>
+            <a:r>
+              <a:rPr lang="en-US" b="0" dirty="0"/>
+              <a:t>RTAB-Map showed repeated surfaces in the generated map.</a:t>
+            </a:r>
+          </a:p>
+          <a:p>
+            <a:pPr marL="685800" lvl="1" indent="-342900">
+              <a:buFont typeface="Arial" panose="020B0604020202020204" pitchFamily="34" charset="0"/>
+              <a:buChar char="•"/>
+            </a:pPr>
+            <a:r>
+              <a:rPr lang="en-US" b="0" dirty="0"/>
+              <a:t>RTAB-Map suffered odometry noise.</a:t>
+            </a:r>
+          </a:p>
+          <a:p>
+            <a:pPr marL="685800" lvl="1" indent="-342900">
+              <a:buFont typeface="Arial" panose="020B0604020202020204" pitchFamily="34" charset="0"/>
+              <a:buChar char="•"/>
+            </a:pPr>
+            <a:r>
+              <a:rPr lang="en-US" dirty="0"/>
+              <a:t>ORB-SLAM both average and maximum trajectory deviation was less than that of RTAB-Map while RTAB-Map map quality was better due to its density. </a:t>
+            </a:r>
+          </a:p>
+          <a:p>
+            <a:pPr marL="342900" indent="-342900">
+              <a:buFont typeface="Arial" panose="020B0604020202020204" pitchFamily="34" charset="0"/>
+              <a:buChar char="•"/>
+            </a:pPr>
+            <a:endParaRPr lang="en-US" b="0" dirty="0"/>
+          </a:p>
+        </p:txBody>
+      </p:sp>
+      <p:sp>
+        <p:nvSpPr>
+          <p:cNvPr id="3" name="Title 2">
+            <a:extLst>
+              <a:ext uri="{FF2B5EF4-FFF2-40B4-BE49-F238E27FC236}">
+                <a16:creationId xmlns:a16="http://schemas.microsoft.com/office/drawing/2014/main" id="{C0FDF4FF-2BE5-44B4-8A65-D68F78B61F93}"/>
+              </a:ext>
+            </a:extLst>
+          </p:cNvPr>
+          <p:cNvSpPr>
+            <a:spLocks noGrp="1"/>
+          </p:cNvSpPr>
+          <p:nvPr>
+            <p:ph type="title"/>
+          </p:nvPr>
+        </p:nvSpPr>
+        <p:spPr/>
+        <p:txBody>
+          <a:bodyPr/>
+          <a:lstStyle/>
+          <a:p>
+            <a:r>
+              <a:rPr lang="en-US" dirty="0"/>
+              <a:t>RTAB-Map Vs. ORB-SLAM2</a:t>
+            </a:r>
+          </a:p>
+        </p:txBody>
+      </p:sp>
+      <p:sp>
+        <p:nvSpPr>
+          <p:cNvPr id="4" name="Rectangle 3">
+            <a:extLst>
+              <a:ext uri="{FF2B5EF4-FFF2-40B4-BE49-F238E27FC236}">
+                <a16:creationId xmlns:a16="http://schemas.microsoft.com/office/drawing/2014/main" id="{0AC0F7B7-95E3-4276-87F0-05D77841CD7C}"/>
+              </a:ext>
+            </a:extLst>
+          </p:cNvPr>
+          <p:cNvSpPr/>
+          <p:nvPr/>
+        </p:nvSpPr>
+        <p:spPr>
+          <a:xfrm>
+            <a:off x="814388" y="950837"/>
+            <a:ext cx="7562850" cy="646331"/>
+          </a:xfrm>
+          <a:prstGeom prst="rect">
+            <a:avLst/>
+          </a:prstGeom>
+        </p:spPr>
+        <p:txBody>
+          <a:bodyPr wrap="square">
+            <a:spAutoFit/>
+          </a:bodyPr>
+          <a:lstStyle/>
+          <a:p>
+            <a:pPr algn="ctr"/>
+            <a:r>
+              <a:rPr lang="en-US" sz="1800" b="1" dirty="0">
+                <a:solidFill>
+                  <a:srgbClr val="00B050"/>
+                </a:solidFill>
+              </a:rPr>
+              <a:t>Comparison of ROS-based Visual SLAM methods in </a:t>
+            </a:r>
+          </a:p>
+          <a:p>
+            <a:pPr algn="ctr"/>
+            <a:r>
+              <a:rPr lang="en-US" sz="1800" b="1" dirty="0">
+                <a:solidFill>
+                  <a:srgbClr val="00B050"/>
+                </a:solidFill>
+              </a:rPr>
+              <a:t>homogeneous indoor environment </a:t>
+            </a:r>
+          </a:p>
+        </p:txBody>
+      </p:sp>
+    </p:spTree>
+    <p:extLst>
+      <p:ext uri="{BB962C8B-B14F-4D97-AF65-F5344CB8AC3E}">
+        <p14:creationId xmlns:p14="http://schemas.microsoft.com/office/powerpoint/2010/main" val="3389337894"/>
+      </p:ext>
+    </p:extLst>
+  </p:cSld>
+  <p:clrMapOvr>
+    <a:masterClrMapping/>
+  </p:clrMapOvr>
+</p:sld>
+</file>
+
+<file path=ppt/slides/slide11.xml><?xml version="1.0" encoding="utf-8"?>
+<p:sld xmlns:a="http://schemas.openxmlformats.org/drawingml/2006/main" xmlns:r="http://schemas.openxmlformats.org/officeDocument/2006/relationships" xmlns:p="http://schemas.openxmlformats.org/presentationml/2006/main">
+  <p:cSld>
+    <p:spTree>
+      <p:nvGrpSpPr>
+        <p:cNvPr id="1" name=""/>
+        <p:cNvGrpSpPr/>
+        <p:nvPr/>
+      </p:nvGrpSpPr>
+      <p:grpSpPr>
+        <a:xfrm>
+          <a:off x="0" y="0"/>
+          <a:ext cx="0" cy="0"/>
+          <a:chOff x="0" y="0"/>
+          <a:chExt cx="0" cy="0"/>
+        </a:xfrm>
+      </p:grpSpPr>
+      <p:sp>
+        <p:nvSpPr>
+          <p:cNvPr id="2" name="Text Placeholder 1">
+            <a:extLst>
+              <a:ext uri="{FF2B5EF4-FFF2-40B4-BE49-F238E27FC236}">
+                <a16:creationId xmlns:a16="http://schemas.microsoft.com/office/drawing/2014/main" id="{D72E0B0E-2E5F-4BB3-95A9-40BD5F1F3929}"/>
+              </a:ext>
+            </a:extLst>
+          </p:cNvPr>
+          <p:cNvSpPr>
+            <a:spLocks noGrp="1"/>
+          </p:cNvSpPr>
+          <p:nvPr>
+            <p:ph type="body" sz="quarter" idx="16"/>
+          </p:nvPr>
+        </p:nvSpPr>
+        <p:spPr/>
+        <p:txBody>
+          <a:bodyPr/>
+          <a:lstStyle/>
+          <a:p>
+            <a:pPr marL="342900" indent="-342900">
+              <a:buFont typeface="Arial" panose="020B0604020202020204" pitchFamily="34" charset="0"/>
+              <a:buChar char="•"/>
+            </a:pPr>
+            <a:r>
+              <a:rPr lang="en-US" dirty="0"/>
+              <a:t>Setup:</a:t>
+            </a:r>
+          </a:p>
+          <a:p>
+            <a:pPr marL="685800" lvl="1" indent="-342900">
+              <a:buFont typeface="Arial" panose="020B0604020202020204" pitchFamily="34" charset="0"/>
+              <a:buChar char="•"/>
+            </a:pPr>
+            <a:r>
+              <a:rPr lang="en-US" b="0" u="sng" dirty="0"/>
+              <a:t>ORB-SLAM2:</a:t>
+            </a:r>
+            <a:r>
+              <a:rPr lang="en-US" b="0" dirty="0"/>
+              <a:t> 16G RAM, 8 CPUs, 240G SSD, 512G HDD </a:t>
+            </a:r>
+          </a:p>
+          <a:p>
+            <a:pPr marL="685800" lvl="1" indent="-342900">
+              <a:buFont typeface="Arial" panose="020B0604020202020204" pitchFamily="34" charset="0"/>
+              <a:buChar char="•"/>
+            </a:pPr>
+            <a:r>
+              <a:rPr lang="en-US" b="0" u="sng" dirty="0"/>
+              <a:t>RTAB-Map:</a:t>
+            </a:r>
+            <a:r>
+              <a:rPr lang="en-US" b="0" dirty="0"/>
+              <a:t> Virtual machine, 7G RAM, 4 CPUs, 512G SSD</a:t>
+            </a:r>
+          </a:p>
+          <a:p>
+            <a:pPr marL="342900" indent="-342900">
+              <a:buFont typeface="Arial" panose="020B0604020202020204" pitchFamily="34" charset="0"/>
+              <a:buChar char="•"/>
+            </a:pPr>
+            <a:r>
+              <a:rPr lang="en-US" dirty="0"/>
+              <a:t>Testing data:</a:t>
+            </a:r>
+          </a:p>
+          <a:p>
+            <a:pPr marL="685800" lvl="1" indent="-342900">
+              <a:buFont typeface="Arial" panose="020B0604020202020204" pitchFamily="34" charset="0"/>
+              <a:buChar char="•"/>
+            </a:pPr>
+            <a:r>
+              <a:rPr lang="en-US" b="0" dirty="0"/>
+              <a:t>KITTI and MIT State Center datasets were used for evaluation.</a:t>
+            </a:r>
+          </a:p>
+          <a:p>
+            <a:pPr marL="342900" indent="-342900">
+              <a:buFont typeface="Arial" panose="020B0604020202020204" pitchFamily="34" charset="0"/>
+              <a:buChar char="•"/>
+            </a:pPr>
+            <a:r>
+              <a:rPr lang="en-US" dirty="0"/>
+              <a:t>Evaluation:</a:t>
+            </a:r>
+          </a:p>
+          <a:p>
+            <a:pPr marL="685800" lvl="1" indent="-342900">
+              <a:buFont typeface="Arial" panose="020B0604020202020204" pitchFamily="34" charset="0"/>
+              <a:buChar char="•"/>
+            </a:pPr>
+            <a:r>
+              <a:rPr lang="en-US" b="0" dirty="0"/>
+              <a:t>Ground truth data provided with each dataset was used. </a:t>
+            </a:r>
+          </a:p>
+          <a:p>
+            <a:pPr marL="685800" lvl="1" indent="-342900">
+              <a:buFont typeface="Arial" panose="020B0604020202020204" pitchFamily="34" charset="0"/>
+              <a:buChar char="•"/>
+            </a:pPr>
+            <a:r>
+              <a:rPr lang="en-US" dirty="0"/>
+              <a:t>Max. and Avg. errors </a:t>
+            </a:r>
+            <a:r>
+              <a:rPr lang="en-US" b="0" dirty="0"/>
+              <a:t>of trajectory was used as performance metric.</a:t>
+            </a:r>
+          </a:p>
+          <a:p>
+            <a:pPr marL="685800" lvl="1" indent="-342900">
+              <a:buFont typeface="Arial" panose="020B0604020202020204" pitchFamily="34" charset="0"/>
+              <a:buChar char="•"/>
+            </a:pPr>
+            <a:r>
+              <a:rPr lang="en-US" dirty="0"/>
+              <a:t>CPU utilization and execution time </a:t>
+            </a:r>
+            <a:r>
+              <a:rPr lang="en-US" b="0" dirty="0"/>
+              <a:t>were reported as indicators for efficiency.</a:t>
+            </a:r>
+          </a:p>
+          <a:p>
+            <a:pPr marL="342900" indent="-342900">
+              <a:buFont typeface="Arial" panose="020B0604020202020204" pitchFamily="34" charset="0"/>
+              <a:buChar char="•"/>
+            </a:pPr>
+            <a:endParaRPr lang="en-US" b="0" dirty="0"/>
+          </a:p>
+          <a:p>
+            <a:pPr marL="342900" indent="-342900">
+              <a:buFont typeface="Arial" panose="020B0604020202020204" pitchFamily="34" charset="0"/>
+              <a:buChar char="•"/>
+            </a:pPr>
+            <a:endParaRPr lang="en-US" b="0" dirty="0"/>
+          </a:p>
+        </p:txBody>
+      </p:sp>
+      <p:sp>
+        <p:nvSpPr>
+          <p:cNvPr id="3" name="Title 2">
+            <a:extLst>
+              <a:ext uri="{FF2B5EF4-FFF2-40B4-BE49-F238E27FC236}">
+                <a16:creationId xmlns:a16="http://schemas.microsoft.com/office/drawing/2014/main" id="{C0FDF4FF-2BE5-44B4-8A65-D68F78B61F93}"/>
+              </a:ext>
+            </a:extLst>
+          </p:cNvPr>
+          <p:cNvSpPr>
+            <a:spLocks noGrp="1"/>
+          </p:cNvSpPr>
+          <p:nvPr>
+            <p:ph type="title"/>
+          </p:nvPr>
+        </p:nvSpPr>
+        <p:spPr/>
+        <p:txBody>
+          <a:bodyPr/>
+          <a:lstStyle/>
+          <a:p>
+            <a:r>
+              <a:rPr lang="en-US" dirty="0"/>
+              <a:t>RTAB-Map Vs. ORB-SLAM2</a:t>
+            </a:r>
+          </a:p>
+        </p:txBody>
+      </p:sp>
+      <p:sp>
+        <p:nvSpPr>
+          <p:cNvPr id="4" name="Rectangle 3">
+            <a:extLst>
+              <a:ext uri="{FF2B5EF4-FFF2-40B4-BE49-F238E27FC236}">
+                <a16:creationId xmlns:a16="http://schemas.microsoft.com/office/drawing/2014/main" id="{0AC0F7B7-95E3-4276-87F0-05D77841CD7C}"/>
+              </a:ext>
+            </a:extLst>
+          </p:cNvPr>
+          <p:cNvSpPr/>
+          <p:nvPr/>
+        </p:nvSpPr>
+        <p:spPr>
+          <a:xfrm>
+            <a:off x="814388" y="950837"/>
+            <a:ext cx="7562850" cy="646331"/>
+          </a:xfrm>
+          <a:prstGeom prst="rect">
+            <a:avLst/>
+          </a:prstGeom>
+        </p:spPr>
+        <p:txBody>
+          <a:bodyPr wrap="square">
+            <a:spAutoFit/>
+          </a:bodyPr>
+          <a:lstStyle/>
+          <a:p>
+            <a:pPr algn="ctr"/>
+            <a:r>
+              <a:rPr lang="en-US" sz="1800" b="1" dirty="0">
+                <a:solidFill>
+                  <a:srgbClr val="00B050"/>
+                </a:solidFill>
+              </a:rPr>
+              <a:t>Comparative Study of </a:t>
+            </a:r>
+          </a:p>
+          <a:p>
+            <a:pPr algn="ctr"/>
+            <a:r>
+              <a:rPr lang="en-US" sz="1800" b="1" dirty="0">
+                <a:solidFill>
+                  <a:srgbClr val="00B050"/>
+                </a:solidFill>
+              </a:rPr>
+              <a:t>Visual Odometry and SLAM Techniques</a:t>
+            </a:r>
+          </a:p>
+        </p:txBody>
+      </p:sp>
+    </p:spTree>
+    <p:extLst>
+      <p:ext uri="{BB962C8B-B14F-4D97-AF65-F5344CB8AC3E}">
+        <p14:creationId xmlns:p14="http://schemas.microsoft.com/office/powerpoint/2010/main" val="337997419"/>
+      </p:ext>
+    </p:extLst>
+  </p:cSld>
+  <p:clrMapOvr>
+    <a:masterClrMapping/>
+  </p:clrMapOvr>
+</p:sld>
+</file>
+
+<file path=ppt/slides/slide12.xml><?xml version="1.0" encoding="utf-8"?>
+<p:sld xmlns:a="http://schemas.openxmlformats.org/drawingml/2006/main" xmlns:r="http://schemas.openxmlformats.org/officeDocument/2006/relationships" xmlns:p="http://schemas.openxmlformats.org/presentationml/2006/main">
+  <p:cSld>
+    <p:spTree>
+      <p:nvGrpSpPr>
+        <p:cNvPr id="1" name=""/>
+        <p:cNvGrpSpPr/>
+        <p:nvPr/>
+      </p:nvGrpSpPr>
+      <p:grpSpPr>
+        <a:xfrm>
+          <a:off x="0" y="0"/>
+          <a:ext cx="0" cy="0"/>
+          <a:chOff x="0" y="0"/>
+          <a:chExt cx="0" cy="0"/>
+        </a:xfrm>
+      </p:grpSpPr>
+      <p:sp>
+        <p:nvSpPr>
+          <p:cNvPr id="2" name="Text Placeholder 1">
+            <a:extLst>
+              <a:ext uri="{FF2B5EF4-FFF2-40B4-BE49-F238E27FC236}">
+                <a16:creationId xmlns:a16="http://schemas.microsoft.com/office/drawing/2014/main" id="{D72E0B0E-2E5F-4BB3-95A9-40BD5F1F3929}"/>
+              </a:ext>
+            </a:extLst>
+          </p:cNvPr>
+          <p:cNvSpPr>
+            <a:spLocks noGrp="1"/>
+          </p:cNvSpPr>
+          <p:nvPr>
+            <p:ph type="body" sz="quarter" idx="16"/>
+          </p:nvPr>
+        </p:nvSpPr>
+        <p:spPr/>
+        <p:txBody>
+          <a:bodyPr/>
+          <a:lstStyle/>
+          <a:p>
+            <a:pPr marL="342900" indent="-342900">
+              <a:buFont typeface="Arial" panose="020B0604020202020204" pitchFamily="34" charset="0"/>
+              <a:buChar char="•"/>
+            </a:pPr>
+            <a:r>
+              <a:rPr lang="en-US" dirty="0"/>
+              <a:t>Key Findings:</a:t>
+            </a:r>
+          </a:p>
+          <a:p>
+            <a:pPr marL="685800" lvl="1" indent="-342900">
+              <a:buFont typeface="Arial" panose="020B0604020202020204" pitchFamily="34" charset="0"/>
+              <a:buChar char="•"/>
+            </a:pPr>
+            <a:r>
+              <a:rPr lang="en-US" b="0" dirty="0"/>
+              <a:t>ORB-SLAM2 generated better trajectories in most of the cases.</a:t>
+            </a:r>
+          </a:p>
+          <a:p>
+            <a:pPr marL="685800" lvl="1" indent="-342900">
+              <a:buFont typeface="Arial" panose="020B0604020202020204" pitchFamily="34" charset="0"/>
+              <a:buChar char="•"/>
+            </a:pPr>
+            <a:r>
+              <a:rPr lang="en-US" b="0" dirty="0"/>
+              <a:t>ORB-SLAM2 can lose a lot of loop closure opportunities when compared to other methods. </a:t>
+            </a:r>
+          </a:p>
+          <a:p>
+            <a:pPr marL="685800" lvl="1" indent="-342900">
+              <a:buFont typeface="Arial" panose="020B0604020202020204" pitchFamily="34" charset="0"/>
+              <a:buChar char="•"/>
+            </a:pPr>
+            <a:r>
+              <a:rPr lang="en-US" b="0" dirty="0"/>
+              <a:t>RTAB-Map showed better efficiency and smaller execution time when depending on internal odometry options, however, higher CPU utilization.</a:t>
+            </a:r>
+          </a:p>
+          <a:p>
+            <a:pPr marL="685800" lvl="1" indent="-342900">
+              <a:buFont typeface="Arial" panose="020B0604020202020204" pitchFamily="34" charset="0"/>
+              <a:buChar char="•"/>
+            </a:pPr>
+            <a:r>
+              <a:rPr lang="en-US" b="0" dirty="0"/>
+              <a:t>RTAB-Map is dependent on the environment and can suffer empty space anomalies in indoor environments</a:t>
+            </a:r>
+            <a:r>
+              <a:rPr lang="en-US" b="0"/>
+              <a:t>.  </a:t>
+            </a:r>
+            <a:endParaRPr lang="en-US" b="0" dirty="0"/>
+          </a:p>
+          <a:p>
+            <a:pPr marL="342900" indent="-342900">
+              <a:buFont typeface="Arial" panose="020B0604020202020204" pitchFamily="34" charset="0"/>
+              <a:buChar char="•"/>
+            </a:pPr>
+            <a:endParaRPr lang="en-US" b="0" dirty="0"/>
+          </a:p>
+          <a:p>
+            <a:pPr marL="342900" indent="-342900">
+              <a:buFont typeface="Arial" panose="020B0604020202020204" pitchFamily="34" charset="0"/>
+              <a:buChar char="•"/>
+            </a:pPr>
+            <a:endParaRPr lang="en-US" b="0" dirty="0"/>
+          </a:p>
+        </p:txBody>
+      </p:sp>
+      <p:sp>
+        <p:nvSpPr>
+          <p:cNvPr id="3" name="Title 2">
+            <a:extLst>
+              <a:ext uri="{FF2B5EF4-FFF2-40B4-BE49-F238E27FC236}">
+                <a16:creationId xmlns:a16="http://schemas.microsoft.com/office/drawing/2014/main" id="{C0FDF4FF-2BE5-44B4-8A65-D68F78B61F93}"/>
+              </a:ext>
+            </a:extLst>
+          </p:cNvPr>
+          <p:cNvSpPr>
+            <a:spLocks noGrp="1"/>
+          </p:cNvSpPr>
+          <p:nvPr>
+            <p:ph type="title"/>
+          </p:nvPr>
+        </p:nvSpPr>
+        <p:spPr/>
+        <p:txBody>
+          <a:bodyPr/>
+          <a:lstStyle/>
+          <a:p>
+            <a:r>
+              <a:rPr lang="en-US" dirty="0"/>
+              <a:t>RTAB-Map Vs. ORB-SLAM2</a:t>
+            </a:r>
+          </a:p>
+        </p:txBody>
+      </p:sp>
+      <p:sp>
+        <p:nvSpPr>
+          <p:cNvPr id="4" name="Rectangle 3">
+            <a:extLst>
+              <a:ext uri="{FF2B5EF4-FFF2-40B4-BE49-F238E27FC236}">
+                <a16:creationId xmlns:a16="http://schemas.microsoft.com/office/drawing/2014/main" id="{0AC0F7B7-95E3-4276-87F0-05D77841CD7C}"/>
+              </a:ext>
+            </a:extLst>
+          </p:cNvPr>
+          <p:cNvSpPr/>
+          <p:nvPr/>
+        </p:nvSpPr>
+        <p:spPr>
+          <a:xfrm>
+            <a:off x="814388" y="950837"/>
+            <a:ext cx="7562850" cy="646331"/>
+          </a:xfrm>
+          <a:prstGeom prst="rect">
+            <a:avLst/>
+          </a:prstGeom>
+        </p:spPr>
+        <p:txBody>
+          <a:bodyPr wrap="square">
+            <a:spAutoFit/>
+          </a:bodyPr>
+          <a:lstStyle/>
+          <a:p>
+            <a:pPr algn="ctr"/>
+            <a:r>
+              <a:rPr lang="en-US" sz="1800" b="1" dirty="0">
+                <a:solidFill>
+                  <a:srgbClr val="00B050"/>
+                </a:solidFill>
+              </a:rPr>
+              <a:t>Comparative Study of </a:t>
+            </a:r>
+          </a:p>
+          <a:p>
+            <a:pPr algn="ctr"/>
+            <a:r>
+              <a:rPr lang="en-US" sz="1800" b="1" dirty="0">
+                <a:solidFill>
+                  <a:srgbClr val="00B050"/>
+                </a:solidFill>
+              </a:rPr>
+              <a:t>Visual Odometry and SLAM Techniques</a:t>
+            </a:r>
+          </a:p>
+        </p:txBody>
+      </p:sp>
+    </p:spTree>
+    <p:extLst>
+      <p:ext uri="{BB962C8B-B14F-4D97-AF65-F5344CB8AC3E}">
+        <p14:creationId xmlns:p14="http://schemas.microsoft.com/office/powerpoint/2010/main" val="1992635447"/>
+      </p:ext>
+    </p:extLst>
+  </p:cSld>
+  <p:clrMapOvr>
+    <a:masterClrMapping/>
+  </p:clrMapOvr>
+</p:sld>
+</file>
+
+<file path=ppt/slides/slide13.xml><?xml version="1.0" encoding="utf-8"?>
+<p:sld xmlns:a="http://schemas.openxmlformats.org/drawingml/2006/main" xmlns:r="http://schemas.openxmlformats.org/officeDocument/2006/relationships" xmlns:p="http://schemas.openxmlformats.org/presentationml/2006/main">
+  <p:cSld>
+    <p:spTree>
+      <p:nvGrpSpPr>
+        <p:cNvPr id="1" name=""/>
+        <p:cNvGrpSpPr/>
+        <p:nvPr/>
+      </p:nvGrpSpPr>
+      <p:grpSpPr>
+        <a:xfrm>
+          <a:off x="0" y="0"/>
+          <a:ext cx="0" cy="0"/>
+          <a:chOff x="0" y="0"/>
+          <a:chExt cx="0" cy="0"/>
+        </a:xfrm>
+      </p:grpSpPr>
+      <p:sp>
+        <p:nvSpPr>
+          <p:cNvPr id="2" name="Text Placeholder 1">
+            <a:extLst>
+              <a:ext uri="{FF2B5EF4-FFF2-40B4-BE49-F238E27FC236}">
+                <a16:creationId xmlns:a16="http://schemas.microsoft.com/office/drawing/2014/main" id="{AAE18D23-CCCF-4B54-8D8C-73CF496E2FB3}"/>
+              </a:ext>
+            </a:extLst>
+          </p:cNvPr>
+          <p:cNvSpPr>
+            <a:spLocks noGrp="1"/>
+          </p:cNvSpPr>
+          <p:nvPr>
+            <p:ph type="body" sz="quarter" idx="16"/>
+          </p:nvPr>
+        </p:nvSpPr>
+        <p:spPr/>
+        <p:txBody>
+          <a:bodyPr/>
+          <a:lstStyle/>
+          <a:p>
+            <a:pPr marL="342900" indent="-342900">
+              <a:buFont typeface="Arial" panose="020B0604020202020204" pitchFamily="34" charset="0"/>
+              <a:buChar char="•"/>
+            </a:pPr>
+            <a:r>
+              <a:rPr lang="en-US" dirty="0"/>
+              <a:t>Both </a:t>
+            </a:r>
+            <a:r>
+              <a:rPr lang="en-US" dirty="0">
+                <a:solidFill>
+                  <a:srgbClr val="00B050"/>
+                </a:solidFill>
+              </a:rPr>
+              <a:t>ORB-SLAM2</a:t>
+            </a:r>
+            <a:r>
+              <a:rPr lang="en-US" dirty="0"/>
+              <a:t> and </a:t>
+            </a:r>
+            <a:r>
+              <a:rPr lang="en-US" dirty="0">
+                <a:solidFill>
+                  <a:srgbClr val="00B050"/>
+                </a:solidFill>
+              </a:rPr>
+              <a:t>RTAB-Map</a:t>
+            </a:r>
+            <a:r>
+              <a:rPr lang="en-US" dirty="0"/>
+              <a:t> are state-of-the-art SLAM algorithms </a:t>
+            </a:r>
+            <a:r>
+              <a:rPr lang="en-US" dirty="0">
+                <a:solidFill>
+                  <a:srgbClr val="00B050"/>
+                </a:solidFill>
+              </a:rPr>
+              <a:t>but each has performance issues under certain conditions</a:t>
+            </a:r>
+            <a:r>
+              <a:rPr lang="en-US" dirty="0"/>
+              <a:t> due to </a:t>
+            </a:r>
+            <a:r>
+              <a:rPr lang="en-US" dirty="0">
+                <a:solidFill>
+                  <a:srgbClr val="00B050"/>
+                </a:solidFill>
+              </a:rPr>
+              <a:t>its architecture</a:t>
+            </a:r>
+            <a:r>
+              <a:rPr lang="en-US" dirty="0"/>
+              <a:t>. </a:t>
+            </a:r>
+          </a:p>
+          <a:p>
+            <a:pPr marL="342900" indent="-342900">
+              <a:buFont typeface="Arial" panose="020B0604020202020204" pitchFamily="34" charset="0"/>
+              <a:buChar char="•"/>
+            </a:pPr>
+            <a:endParaRPr lang="en-US" dirty="0"/>
+          </a:p>
+          <a:p>
+            <a:pPr marL="342900" indent="-342900">
+              <a:buFont typeface="Arial" panose="020B0604020202020204" pitchFamily="34" charset="0"/>
+              <a:buChar char="•"/>
+            </a:pPr>
+            <a:r>
+              <a:rPr lang="en-US" dirty="0"/>
+              <a:t>ORB-SLAM2 optimizes </a:t>
+            </a:r>
+            <a:r>
+              <a:rPr lang="en-US" dirty="0">
+                <a:solidFill>
+                  <a:srgbClr val="00B050"/>
+                </a:solidFill>
+              </a:rPr>
+              <a:t>both camera poses and map points </a:t>
+            </a:r>
+            <a:r>
+              <a:rPr lang="en-US" dirty="0"/>
+              <a:t>(2 levels of optimization) while RTAB-Map only optimize</a:t>
+            </a:r>
+            <a:r>
+              <a:rPr lang="en-US" dirty="0">
+                <a:solidFill>
+                  <a:srgbClr val="00B050"/>
+                </a:solidFill>
+              </a:rPr>
+              <a:t> camera poses</a:t>
+            </a:r>
+            <a:r>
+              <a:rPr lang="en-US" dirty="0"/>
+              <a:t>.</a:t>
+            </a:r>
+          </a:p>
+          <a:p>
+            <a:pPr marL="342900" indent="-342900">
+              <a:buFont typeface="Arial" panose="020B0604020202020204" pitchFamily="34" charset="0"/>
+              <a:buChar char="•"/>
+            </a:pPr>
+            <a:endParaRPr lang="en-US" dirty="0"/>
+          </a:p>
+          <a:p>
+            <a:pPr marL="342900" indent="-342900">
+              <a:buFont typeface="Arial" panose="020B0604020202020204" pitchFamily="34" charset="0"/>
+              <a:buChar char="•"/>
+            </a:pPr>
+            <a:r>
+              <a:rPr lang="en-US" dirty="0"/>
+              <a:t>Integration</a:t>
+            </a:r>
+            <a:r>
+              <a:rPr lang="en-US" dirty="0">
+                <a:solidFill>
+                  <a:srgbClr val="00B050"/>
+                </a:solidFill>
+              </a:rPr>
+              <a:t> </a:t>
+            </a:r>
+            <a:r>
+              <a:rPr lang="en-US" dirty="0"/>
+              <a:t>of both algorithms can yield </a:t>
+            </a:r>
+            <a:r>
+              <a:rPr lang="en-US" dirty="0">
+                <a:solidFill>
+                  <a:srgbClr val="00B050"/>
+                </a:solidFill>
+              </a:rPr>
+              <a:t>more reliable solution</a:t>
+            </a:r>
+            <a:r>
+              <a:rPr lang="en-US" dirty="0"/>
+              <a:t> and can achieve </a:t>
+            </a:r>
+            <a:r>
+              <a:rPr lang="en-US" dirty="0">
+                <a:solidFill>
+                  <a:srgbClr val="00B050"/>
+                </a:solidFill>
+              </a:rPr>
+              <a:t>better performance under wider range of scenarios</a:t>
+            </a:r>
+            <a:r>
+              <a:rPr lang="en-US" dirty="0"/>
+              <a:t>. </a:t>
+            </a:r>
+          </a:p>
+        </p:txBody>
+      </p:sp>
+      <p:sp>
+        <p:nvSpPr>
+          <p:cNvPr id="3" name="Title 2">
+            <a:extLst>
+              <a:ext uri="{FF2B5EF4-FFF2-40B4-BE49-F238E27FC236}">
+                <a16:creationId xmlns:a16="http://schemas.microsoft.com/office/drawing/2014/main" id="{FF94E667-1C3D-4043-8FE4-F892B8FE1C65}"/>
+              </a:ext>
+            </a:extLst>
+          </p:cNvPr>
+          <p:cNvSpPr>
+            <a:spLocks noGrp="1"/>
+          </p:cNvSpPr>
+          <p:nvPr>
+            <p:ph type="title"/>
+          </p:nvPr>
+        </p:nvSpPr>
+        <p:spPr/>
+        <p:txBody>
+          <a:bodyPr/>
+          <a:lstStyle/>
+          <a:p>
+            <a:pPr marL="342900" indent="-342900"/>
+            <a:r>
+              <a:rPr lang="en-US" dirty="0"/>
+              <a:t>Problem Definition: </a:t>
+            </a:r>
+            <a:r>
+              <a:rPr lang="en-US" b="0" dirty="0"/>
+              <a:t>Revisiting</a:t>
+            </a:r>
+            <a:endParaRPr lang="en-US" dirty="0"/>
+          </a:p>
+        </p:txBody>
+      </p:sp>
+    </p:spTree>
+    <p:extLst>
+      <p:ext uri="{BB962C8B-B14F-4D97-AF65-F5344CB8AC3E}">
+        <p14:creationId xmlns:p14="http://schemas.microsoft.com/office/powerpoint/2010/main" val="924476771"/>
+      </p:ext>
+    </p:extLst>
+  </p:cSld>
+  <p:clrMapOvr>
+    <a:masterClrMapping/>
+  </p:clrMapOvr>
+</p:sld>
+</file>
+
+<file path=ppt/slides/slide14.xml><?xml version="1.0" encoding="utf-8"?>
+<p:sld xmlns:a="http://schemas.openxmlformats.org/drawingml/2006/main" xmlns:r="http://schemas.openxmlformats.org/officeDocument/2006/relationships" xmlns:p="http://schemas.openxmlformats.org/presentationml/2006/main">
+  <p:cSld>
+    <p:spTree>
+      <p:nvGrpSpPr>
+        <p:cNvPr id="1" name=""/>
+        <p:cNvGrpSpPr/>
+        <p:nvPr/>
+      </p:nvGrpSpPr>
+      <p:grpSpPr>
+        <a:xfrm>
+          <a:off x="0" y="0"/>
+          <a:ext cx="0" cy="0"/>
+          <a:chOff x="0" y="0"/>
+          <a:chExt cx="0" cy="0"/>
+        </a:xfrm>
+      </p:grpSpPr>
+      <p:sp>
+        <p:nvSpPr>
+          <p:cNvPr id="2" name="Text Placeholder 1">
+            <a:extLst>
+              <a:ext uri="{FF2B5EF4-FFF2-40B4-BE49-F238E27FC236}">
+                <a16:creationId xmlns:a16="http://schemas.microsoft.com/office/drawing/2014/main" id="{A486BDD8-C15B-451E-A593-40D405E1193E}"/>
+              </a:ext>
+            </a:extLst>
+          </p:cNvPr>
+          <p:cNvSpPr>
+            <a:spLocks noGrp="1"/>
+          </p:cNvSpPr>
+          <p:nvPr>
+            <p:ph type="body" sz="quarter" idx="16"/>
+          </p:nvPr>
+        </p:nvSpPr>
+        <p:spPr/>
+        <p:txBody>
+          <a:bodyPr/>
+          <a:lstStyle/>
+          <a:p>
+            <a:pPr marL="342900" indent="-342900">
+              <a:buFont typeface="Arial" panose="020B0604020202020204" pitchFamily="34" charset="0"/>
+              <a:buChar char="•"/>
+            </a:pPr>
+            <a:r>
+              <a:rPr lang="en-US" dirty="0"/>
+              <a:t>In a nutshell, we are trying to </a:t>
+            </a:r>
+            <a:r>
+              <a:rPr lang="en-US" dirty="0">
+                <a:solidFill>
+                  <a:srgbClr val="00B050"/>
+                </a:solidFill>
+              </a:rPr>
+              <a:t>utilize the optimized map points from ORB-SLAM2</a:t>
+            </a:r>
+            <a:r>
+              <a:rPr lang="en-US" dirty="0"/>
+              <a:t> in RTAB-Map in order to </a:t>
+            </a:r>
+            <a:r>
+              <a:rPr lang="en-US" dirty="0">
+                <a:solidFill>
+                  <a:srgbClr val="00B050"/>
+                </a:solidFill>
+              </a:rPr>
+              <a:t>enhance its accuracy.</a:t>
+            </a:r>
+          </a:p>
+          <a:p>
+            <a:pPr marL="342900" indent="-342900">
+              <a:buFont typeface="Arial" panose="020B0604020202020204" pitchFamily="34" charset="0"/>
+              <a:buChar char="•"/>
+            </a:pPr>
+            <a:r>
+              <a:rPr lang="en-US" dirty="0">
+                <a:solidFill>
+                  <a:srgbClr val="00B050"/>
+                </a:solidFill>
+              </a:rPr>
+              <a:t>Input controls are dependent on the dataset under test </a:t>
+            </a:r>
+            <a:r>
+              <a:rPr lang="en-US" dirty="0"/>
+              <a:t>(DUT) and is sent to both ORB-SLAM2 and RTAB-Map. </a:t>
+            </a:r>
+            <a:r>
+              <a:rPr lang="en-US" dirty="0">
+                <a:solidFill>
+                  <a:srgbClr val="00B050"/>
+                </a:solidFill>
+              </a:rPr>
+              <a:t> </a:t>
+            </a:r>
+            <a:endParaRPr lang="en-US" dirty="0"/>
+          </a:p>
+        </p:txBody>
+      </p:sp>
+      <p:sp>
+        <p:nvSpPr>
+          <p:cNvPr id="3" name="Title 2">
+            <a:extLst>
+              <a:ext uri="{FF2B5EF4-FFF2-40B4-BE49-F238E27FC236}">
+                <a16:creationId xmlns:a16="http://schemas.microsoft.com/office/drawing/2014/main" id="{FA6164BB-0384-4AA7-A10B-34C6FA615FBC}"/>
+              </a:ext>
+            </a:extLst>
+          </p:cNvPr>
+          <p:cNvSpPr>
+            <a:spLocks noGrp="1"/>
+          </p:cNvSpPr>
+          <p:nvPr>
+            <p:ph type="title"/>
+          </p:nvPr>
+        </p:nvSpPr>
+        <p:spPr/>
+        <p:txBody>
+          <a:bodyPr/>
+          <a:lstStyle/>
+          <a:p>
+            <a:r>
+              <a:rPr lang="en-US" dirty="0"/>
+              <a:t>System Block Diagram: </a:t>
+            </a:r>
+            <a:r>
+              <a:rPr lang="en-US" b="0" dirty="0"/>
+              <a:t>Abstract</a:t>
+            </a:r>
+            <a:endParaRPr lang="en-US" dirty="0"/>
+          </a:p>
+        </p:txBody>
+      </p:sp>
+      <p:pic>
+        <p:nvPicPr>
+          <p:cNvPr id="5" name="Picture 4">
+            <a:extLst>
+              <a:ext uri="{FF2B5EF4-FFF2-40B4-BE49-F238E27FC236}">
+                <a16:creationId xmlns:a16="http://schemas.microsoft.com/office/drawing/2014/main" id="{A6E1A9E5-3025-4E18-903B-545394D28264}"/>
+              </a:ext>
+            </a:extLst>
+          </p:cNvPr>
+          <p:cNvPicPr>
+            <a:picLocks noChangeAspect="1"/>
+          </p:cNvPicPr>
+          <p:nvPr/>
+        </p:nvPicPr>
+        <p:blipFill>
+          <a:blip r:embed="rId2"/>
+          <a:stretch>
+            <a:fillRect/>
+          </a:stretch>
+        </p:blipFill>
+        <p:spPr>
+          <a:xfrm>
+            <a:off x="0" y="3564922"/>
+            <a:ext cx="9144000" cy="3055556"/>
+          </a:xfrm>
+          <a:prstGeom prst="rect">
+            <a:avLst/>
+          </a:prstGeom>
+        </p:spPr>
+      </p:pic>
+    </p:spTree>
+    <p:extLst>
+      <p:ext uri="{BB962C8B-B14F-4D97-AF65-F5344CB8AC3E}">
+        <p14:creationId xmlns:p14="http://schemas.microsoft.com/office/powerpoint/2010/main" val="3357442110"/>
+      </p:ext>
+    </p:extLst>
+  </p:cSld>
+  <p:clrMapOvr>
+    <a:masterClrMapping/>
+  </p:clrMapOvr>
+</p:sld>
+</file>
+
+<file path=ppt/slides/slide15.xml><?xml version="1.0" encoding="utf-8"?>
+<p:sld xmlns:a="http://schemas.openxmlformats.org/drawingml/2006/main" xmlns:r="http://schemas.openxmlformats.org/officeDocument/2006/relationships" xmlns:p="http://schemas.openxmlformats.org/presentationml/2006/main">
+  <p:cSld>
+    <p:spTree>
+      <p:nvGrpSpPr>
+        <p:cNvPr id="1" name=""/>
+        <p:cNvGrpSpPr/>
+        <p:nvPr/>
+      </p:nvGrpSpPr>
+      <p:grpSpPr>
+        <a:xfrm>
+          <a:off x="0" y="0"/>
+          <a:ext cx="0" cy="0"/>
+          <a:chOff x="0" y="0"/>
+          <a:chExt cx="0" cy="0"/>
+        </a:xfrm>
+      </p:grpSpPr>
+      <p:sp>
+        <p:nvSpPr>
+          <p:cNvPr id="3" name="Title 2">
+            <a:extLst>
+              <a:ext uri="{FF2B5EF4-FFF2-40B4-BE49-F238E27FC236}">
+                <a16:creationId xmlns:a16="http://schemas.microsoft.com/office/drawing/2014/main" id="{0CC138BA-64D3-4572-B81F-AE21E7FCB087}"/>
+              </a:ext>
+            </a:extLst>
+          </p:cNvPr>
+          <p:cNvSpPr>
+            <a:spLocks noGrp="1"/>
+          </p:cNvSpPr>
+          <p:nvPr>
+            <p:ph type="title"/>
+          </p:nvPr>
+        </p:nvSpPr>
+        <p:spPr/>
+        <p:txBody>
+          <a:bodyPr/>
+          <a:lstStyle/>
+          <a:p>
+            <a:r>
+              <a:rPr lang="en-US" dirty="0"/>
+              <a:t>System Block Diagram: </a:t>
+            </a:r>
+            <a:r>
+              <a:rPr lang="en-US" b="0" dirty="0"/>
+              <a:t>Detailed</a:t>
+            </a:r>
+            <a:endParaRPr lang="en-US" dirty="0"/>
+          </a:p>
+        </p:txBody>
+      </p:sp>
+      <p:pic>
+        <p:nvPicPr>
+          <p:cNvPr id="5" name="Picture 4">
+            <a:extLst>
+              <a:ext uri="{FF2B5EF4-FFF2-40B4-BE49-F238E27FC236}">
+                <a16:creationId xmlns:a16="http://schemas.microsoft.com/office/drawing/2014/main" id="{F6E64E13-C1E8-4A63-8A14-5CAB3C77175E}"/>
+              </a:ext>
+            </a:extLst>
+          </p:cNvPr>
+          <p:cNvPicPr>
+            <a:picLocks noChangeAspect="1"/>
+          </p:cNvPicPr>
+          <p:nvPr/>
+        </p:nvPicPr>
+        <p:blipFill>
+          <a:blip r:embed="rId2"/>
+          <a:stretch>
+            <a:fillRect/>
+          </a:stretch>
+        </p:blipFill>
+        <p:spPr>
+          <a:xfrm>
+            <a:off x="0" y="1376093"/>
+            <a:ext cx="9144000" cy="5084618"/>
+          </a:xfrm>
+          <a:prstGeom prst="rect">
+            <a:avLst/>
+          </a:prstGeom>
+        </p:spPr>
+      </p:pic>
+    </p:spTree>
+    <p:extLst>
+      <p:ext uri="{BB962C8B-B14F-4D97-AF65-F5344CB8AC3E}">
+        <p14:creationId xmlns:p14="http://schemas.microsoft.com/office/powerpoint/2010/main" val="1106994731"/>
+      </p:ext>
+    </p:extLst>
+  </p:cSld>
+  <p:clrMapOvr>
+    <a:masterClrMapping/>
+  </p:clrMapOvr>
+</p:sld>
+</file>
+
+<file path=ppt/slides/slide16.xml><?xml version="1.0" encoding="utf-8"?>
+<p:sld xmlns:a="http://schemas.openxmlformats.org/drawingml/2006/main" xmlns:r="http://schemas.openxmlformats.org/officeDocument/2006/relationships" xmlns:p="http://schemas.openxmlformats.org/presentationml/2006/main">
+  <p:cSld>
+    <p:spTree>
+      <p:nvGrpSpPr>
+        <p:cNvPr id="1" name=""/>
+        <p:cNvGrpSpPr/>
+        <p:nvPr/>
+      </p:nvGrpSpPr>
+      <p:grpSpPr>
+        <a:xfrm>
+          <a:off x="0" y="0"/>
+          <a:ext cx="0" cy="0"/>
+          <a:chOff x="0" y="0"/>
+          <a:chExt cx="0" cy="0"/>
+        </a:xfrm>
+      </p:grpSpPr>
+      <p:sp>
+        <p:nvSpPr>
           <p:cNvPr id="3" name="Title 2">
             <a:extLst>
               <a:ext uri="{FF2B5EF4-FFF2-40B4-BE49-F238E27FC236}">
@@ -9091,7 +10257,7 @@
 </p:sld>
 </file>
 
-<file path=ppt/slides/slide11.xml><?xml version="1.0" encoding="utf-8"?>
+<file path=ppt/slides/slide17.xml><?xml version="1.0" encoding="utf-8"?>
 <p:sld xmlns:a="http://schemas.openxmlformats.org/drawingml/2006/main" xmlns:r="http://schemas.openxmlformats.org/officeDocument/2006/relationships" xmlns:p="http://schemas.openxmlformats.org/presentationml/2006/main">
   <p:cSld>
     <p:spTree>
@@ -10595,7 +11761,7 @@
 </p:sld>
 </file>
 
-<file path=ppt/slides/slide12.xml><?xml version="1.0" encoding="utf-8"?>
+<file path=ppt/slides/slide18.xml><?xml version="1.0" encoding="utf-8"?>
 <p:sld xmlns:a="http://schemas.openxmlformats.org/drawingml/2006/main" xmlns:r="http://schemas.openxmlformats.org/officeDocument/2006/relationships" xmlns:p="http://schemas.openxmlformats.org/presentationml/2006/main">
   <p:cSld>
     <p:spTree>
@@ -10770,7 +11936,7 @@
 </p:sld>
 </file>
 
-<file path=ppt/slides/slide13.xml><?xml version="1.0" encoding="utf-8"?>
+<file path=ppt/slides/slide19.xml><?xml version="1.0" encoding="utf-8"?>
 <p:sld xmlns:a="http://schemas.openxmlformats.org/drawingml/2006/main" xmlns:r="http://schemas.openxmlformats.org/officeDocument/2006/relationships" xmlns:p="http://schemas.openxmlformats.org/presentationml/2006/main">
   <p:cSld>
     <p:spTree>
@@ -10943,7 +12109,233 @@
 </p:sld>
 </file>
 
-<file path=ppt/slides/slide14.xml><?xml version="1.0" encoding="utf-8"?>
+<file path=ppt/slides/slide2.xml><?xml version="1.0" encoding="utf-8"?>
+<p:sld xmlns:a="http://schemas.openxmlformats.org/drawingml/2006/main" xmlns:r="http://schemas.openxmlformats.org/officeDocument/2006/relationships" xmlns:p="http://schemas.openxmlformats.org/presentationml/2006/main">
+  <p:cSld>
+    <p:spTree>
+      <p:nvGrpSpPr>
+        <p:cNvPr id="1" name=""/>
+        <p:cNvGrpSpPr/>
+        <p:nvPr/>
+      </p:nvGrpSpPr>
+      <p:grpSpPr>
+        <a:xfrm>
+          <a:off x="0" y="0"/>
+          <a:ext cx="0" cy="0"/>
+          <a:chOff x="0" y="0"/>
+          <a:chExt cx="0" cy="0"/>
+        </a:xfrm>
+      </p:grpSpPr>
+      <p:sp>
+        <p:nvSpPr>
+          <p:cNvPr id="13" name="Text Placeholder 12">
+            <a:extLst>
+              <a:ext uri="{FF2B5EF4-FFF2-40B4-BE49-F238E27FC236}">
+                <a16:creationId xmlns:a16="http://schemas.microsoft.com/office/drawing/2014/main" id="{03B27027-B59A-4E6B-B377-A7A8C7EF4555}"/>
+              </a:ext>
+            </a:extLst>
+          </p:cNvPr>
+          <p:cNvSpPr>
+            <a:spLocks noGrp="1"/>
+          </p:cNvSpPr>
+          <p:nvPr>
+            <p:ph type="body" sz="quarter" idx="16"/>
+          </p:nvPr>
+        </p:nvSpPr>
+        <p:spPr>
+          <a:xfrm>
+            <a:off x="329407" y="1608667"/>
+            <a:ext cx="8485186" cy="4664363"/>
+          </a:xfrm>
+        </p:spPr>
+        <p:txBody>
+          <a:bodyPr numCol="2" spcCol="182880"/>
+          <a:lstStyle/>
+          <a:p>
+            <a:pPr marL="342900" indent="-342900">
+              <a:buFont typeface="Courier New" panose="02070309020205020404" pitchFamily="49" charset="0"/>
+              <a:buChar char="o"/>
+            </a:pPr>
+            <a:r>
+              <a:rPr lang="en-US" dirty="0"/>
+              <a:t>Introduction</a:t>
+            </a:r>
+          </a:p>
+          <a:p>
+            <a:pPr marL="342900" indent="-342900">
+              <a:buFont typeface="Courier New" panose="02070309020205020404" pitchFamily="49" charset="0"/>
+              <a:buChar char="o"/>
+            </a:pPr>
+            <a:r>
+              <a:rPr lang="en-US" dirty="0"/>
+              <a:t>Background : </a:t>
+            </a:r>
+            <a:r>
+              <a:rPr lang="en-US" b="0" dirty="0"/>
+              <a:t>RTAB-Map</a:t>
+            </a:r>
+          </a:p>
+          <a:p>
+            <a:pPr marL="342900" indent="-342900">
+              <a:buFont typeface="Courier New" panose="02070309020205020404" pitchFamily="49" charset="0"/>
+              <a:buChar char="o"/>
+            </a:pPr>
+            <a:r>
+              <a:rPr lang="en-US" dirty="0"/>
+              <a:t>Background : </a:t>
+            </a:r>
+            <a:r>
+              <a:rPr lang="en-US" b="0" dirty="0"/>
+              <a:t>ORB-SLAM2</a:t>
+            </a:r>
+          </a:p>
+          <a:p>
+            <a:pPr marL="342900" indent="-342900">
+              <a:buFont typeface="Courier New" panose="02070309020205020404" pitchFamily="49" charset="0"/>
+              <a:buChar char="o"/>
+            </a:pPr>
+            <a:r>
+              <a:rPr lang="en-US" dirty="0"/>
+              <a:t>RTAB-Map Vs. ORB-SLAM2</a:t>
+            </a:r>
+          </a:p>
+          <a:p>
+            <a:pPr marL="342900" indent="-342900">
+              <a:buFont typeface="Courier New" panose="02070309020205020404" pitchFamily="49" charset="0"/>
+              <a:buChar char="o"/>
+            </a:pPr>
+            <a:r>
+              <a:rPr lang="en-US" dirty="0"/>
+              <a:t>Problem Definition</a:t>
+            </a:r>
+          </a:p>
+          <a:p>
+            <a:pPr marL="685800" lvl="1" indent="-342900">
+              <a:buFont typeface="Courier New" panose="02070309020205020404" pitchFamily="49" charset="0"/>
+              <a:buChar char="o"/>
+              <a:tabLst>
+                <a:tab pos="406400" algn="l"/>
+              </a:tabLst>
+            </a:pPr>
+            <a:r>
+              <a:rPr lang="en-US" b="0" dirty="0"/>
+              <a:t>Revisiting</a:t>
+            </a:r>
+          </a:p>
+          <a:p>
+            <a:pPr marL="342900" indent="-342900">
+              <a:buFont typeface="Courier New" panose="02070309020205020404" pitchFamily="49" charset="0"/>
+              <a:buChar char="o"/>
+            </a:pPr>
+            <a:r>
+              <a:rPr lang="en-US" dirty="0"/>
+              <a:t>System Block Diagram</a:t>
+            </a:r>
+          </a:p>
+          <a:p>
+            <a:pPr marL="685800" lvl="1" indent="-342900">
+              <a:buFont typeface="Courier New" panose="02070309020205020404" pitchFamily="49" charset="0"/>
+              <a:buChar char="o"/>
+            </a:pPr>
+            <a:r>
+              <a:rPr lang="en-US" b="0" dirty="0"/>
+              <a:t>Abstract Integration Structure</a:t>
+            </a:r>
+          </a:p>
+          <a:p>
+            <a:pPr marL="685800" lvl="1" indent="-342900">
+              <a:buFont typeface="Courier New" panose="02070309020205020404" pitchFamily="49" charset="0"/>
+              <a:buChar char="o"/>
+            </a:pPr>
+            <a:r>
+              <a:rPr lang="en-US" b="0" dirty="0"/>
+              <a:t>Detailed Block Diagram</a:t>
+            </a:r>
+          </a:p>
+          <a:p>
+            <a:pPr marL="342900" indent="-342900">
+              <a:buFont typeface="Courier New" panose="02070309020205020404" pitchFamily="49" charset="0"/>
+              <a:buChar char="o"/>
+            </a:pPr>
+            <a:r>
+              <a:rPr lang="en-US" dirty="0"/>
+              <a:t>Initial Baseline Results</a:t>
+            </a:r>
+          </a:p>
+          <a:p>
+            <a:pPr marL="682625" lvl="1" indent="-342900">
+              <a:buFont typeface="Courier New" panose="02070309020205020404" pitchFamily="49" charset="0"/>
+              <a:buChar char="o"/>
+            </a:pPr>
+            <a:r>
+              <a:rPr lang="en-US" b="0" dirty="0"/>
+              <a:t>KITTI &amp; TUM datasets Results</a:t>
+            </a:r>
+          </a:p>
+          <a:p>
+            <a:pPr marL="682625" lvl="1" indent="-342900">
+              <a:buFont typeface="Courier New" panose="02070309020205020404" pitchFamily="49" charset="0"/>
+              <a:buChar char="o"/>
+            </a:pPr>
+            <a:r>
+              <a:rPr lang="en-US" b="0" dirty="0"/>
+              <a:t>Discussion</a:t>
+            </a:r>
+          </a:p>
+          <a:p>
+            <a:pPr marL="342900" indent="-342900">
+              <a:buFont typeface="Courier New" panose="02070309020205020404" pitchFamily="49" charset="0"/>
+              <a:buChar char="o"/>
+            </a:pPr>
+            <a:r>
+              <a:rPr lang="en-US" dirty="0"/>
+              <a:t>Open Questions</a:t>
+            </a:r>
+          </a:p>
+        </p:txBody>
+      </p:sp>
+      <p:sp>
+        <p:nvSpPr>
+          <p:cNvPr id="12" name="Title 11">
+            <a:extLst>
+              <a:ext uri="{FF2B5EF4-FFF2-40B4-BE49-F238E27FC236}">
+                <a16:creationId xmlns:a16="http://schemas.microsoft.com/office/drawing/2014/main" id="{2DD2AFE4-63BE-45E4-B15C-024DB8D8D5D6}"/>
+              </a:ext>
+            </a:extLst>
+          </p:cNvPr>
+          <p:cNvSpPr>
+            <a:spLocks noGrp="1"/>
+          </p:cNvSpPr>
+          <p:nvPr>
+            <p:ph type="title"/>
+          </p:nvPr>
+        </p:nvSpPr>
+        <p:spPr/>
+        <p:txBody>
+          <a:bodyPr/>
+          <a:lstStyle/>
+          <a:p>
+            <a:r>
+              <a:rPr lang="en-US" dirty="0"/>
+              <a:t>Agenda</a:t>
+            </a:r>
+          </a:p>
+        </p:txBody>
+      </p:sp>
+    </p:spTree>
+    <p:extLst>
+      <p:ext uri="{BB962C8B-B14F-4D97-AF65-F5344CB8AC3E}">
+        <p14:creationId xmlns:p14="http://schemas.microsoft.com/office/powerpoint/2010/main" val="2822485740"/>
+      </p:ext>
+    </p:extLst>
+  </p:cSld>
+  <p:clrMapOvr>
+    <a:masterClrMapping/>
+  </p:clrMapOvr>
+</p:sld>
+</file>
+
+<file path=ppt/slides/slide20.xml><?xml version="1.0" encoding="utf-8"?>
 <p:sld xmlns:a="http://schemas.openxmlformats.org/drawingml/2006/main" xmlns:r="http://schemas.openxmlformats.org/officeDocument/2006/relationships" xmlns:p="http://schemas.openxmlformats.org/presentationml/2006/main">
   <p:cSld>
     <p:spTree>
@@ -11116,7 +12508,7 @@
 </p:sld>
 </file>
 
-<file path=ppt/slides/slide15.xml><?xml version="1.0" encoding="utf-8"?>
+<file path=ppt/slides/slide21.xml><?xml version="1.0" encoding="utf-8"?>
 <p:sld xmlns:a="http://schemas.openxmlformats.org/drawingml/2006/main" xmlns:r="http://schemas.openxmlformats.org/officeDocument/2006/relationships" xmlns:p="http://schemas.openxmlformats.org/presentationml/2006/main">
   <p:cSld>
     <p:spTree>
@@ -12553,7 +13945,7 @@
 </p:sld>
 </file>
 
-<file path=ppt/slides/slide16.xml><?xml version="1.0" encoding="utf-8"?>
+<file path=ppt/slides/slide22.xml><?xml version="1.0" encoding="utf-8"?>
 <p:sld xmlns:a="http://schemas.openxmlformats.org/drawingml/2006/main" xmlns:r="http://schemas.openxmlformats.org/officeDocument/2006/relationships" xmlns:p="http://schemas.openxmlformats.org/presentationml/2006/main">
   <p:cSld>
     <p:spTree>
@@ -12694,7 +14086,7 @@
 </p:sld>
 </file>
 
-<file path=ppt/slides/slide17.xml><?xml version="1.0" encoding="utf-8"?>
+<file path=ppt/slides/slide23.xml><?xml version="1.0" encoding="utf-8"?>
 <p:sld xmlns:a="http://schemas.openxmlformats.org/drawingml/2006/main" xmlns:r="http://schemas.openxmlformats.org/officeDocument/2006/relationships" xmlns:p="http://schemas.openxmlformats.org/presentationml/2006/main">
   <p:cSld>
     <p:spTree>
@@ -12820,7 +14212,7 @@
 </p:sld>
 </file>
 
-<file path=ppt/slides/slide18.xml><?xml version="1.0" encoding="utf-8"?>
+<file path=ppt/slides/slide24.xml><?xml version="1.0" encoding="utf-8"?>
 <p:sld xmlns:a="http://schemas.openxmlformats.org/drawingml/2006/main" xmlns:r="http://schemas.openxmlformats.org/officeDocument/2006/relationships" xmlns:p="http://schemas.openxmlformats.org/presentationml/2006/main">
   <p:cSld>
     <p:spTree>
@@ -12903,232 +14295,6 @@
     <p:extLst>
       <p:ext uri="{BB962C8B-B14F-4D97-AF65-F5344CB8AC3E}">
         <p14:creationId xmlns:p14="http://schemas.microsoft.com/office/powerpoint/2010/main" val="1554159479"/>
-      </p:ext>
-    </p:extLst>
-  </p:cSld>
-  <p:clrMapOvr>
-    <a:masterClrMapping/>
-  </p:clrMapOvr>
-</p:sld>
-</file>
-
-<file path=ppt/slides/slide2.xml><?xml version="1.0" encoding="utf-8"?>
-<p:sld xmlns:a="http://schemas.openxmlformats.org/drawingml/2006/main" xmlns:r="http://schemas.openxmlformats.org/officeDocument/2006/relationships" xmlns:p="http://schemas.openxmlformats.org/presentationml/2006/main">
-  <p:cSld>
-    <p:spTree>
-      <p:nvGrpSpPr>
-        <p:cNvPr id="1" name=""/>
-        <p:cNvGrpSpPr/>
-        <p:nvPr/>
-      </p:nvGrpSpPr>
-      <p:grpSpPr>
-        <a:xfrm>
-          <a:off x="0" y="0"/>
-          <a:ext cx="0" cy="0"/>
-          <a:chOff x="0" y="0"/>
-          <a:chExt cx="0" cy="0"/>
-        </a:xfrm>
-      </p:grpSpPr>
-      <p:sp>
-        <p:nvSpPr>
-          <p:cNvPr id="13" name="Text Placeholder 12">
-            <a:extLst>
-              <a:ext uri="{FF2B5EF4-FFF2-40B4-BE49-F238E27FC236}">
-                <a16:creationId xmlns:a16="http://schemas.microsoft.com/office/drawing/2014/main" id="{03B27027-B59A-4E6B-B377-A7A8C7EF4555}"/>
-              </a:ext>
-            </a:extLst>
-          </p:cNvPr>
-          <p:cNvSpPr>
-            <a:spLocks noGrp="1"/>
-          </p:cNvSpPr>
-          <p:nvPr>
-            <p:ph type="body" sz="quarter" idx="16"/>
-          </p:nvPr>
-        </p:nvSpPr>
-        <p:spPr>
-          <a:xfrm>
-            <a:off x="329407" y="1608667"/>
-            <a:ext cx="8485186" cy="4664363"/>
-          </a:xfrm>
-        </p:spPr>
-        <p:txBody>
-          <a:bodyPr numCol="2" spcCol="182880"/>
-          <a:lstStyle/>
-          <a:p>
-            <a:pPr marL="342900" indent="-342900">
-              <a:buFont typeface="Courier New" panose="02070309020205020404" pitchFamily="49" charset="0"/>
-              <a:buChar char="o"/>
-            </a:pPr>
-            <a:r>
-              <a:rPr lang="en-US" dirty="0"/>
-              <a:t>Introduction</a:t>
-            </a:r>
-          </a:p>
-          <a:p>
-            <a:pPr marL="342900" indent="-342900">
-              <a:buFont typeface="Courier New" panose="02070309020205020404" pitchFamily="49" charset="0"/>
-              <a:buChar char="o"/>
-            </a:pPr>
-            <a:r>
-              <a:rPr lang="en-US" dirty="0"/>
-              <a:t>Background : </a:t>
-            </a:r>
-            <a:r>
-              <a:rPr lang="en-US" b="0" dirty="0"/>
-              <a:t>RTAB-Map</a:t>
-            </a:r>
-          </a:p>
-          <a:p>
-            <a:pPr marL="342900" indent="-342900">
-              <a:buFont typeface="Courier New" panose="02070309020205020404" pitchFamily="49" charset="0"/>
-              <a:buChar char="o"/>
-            </a:pPr>
-            <a:r>
-              <a:rPr lang="en-US" dirty="0"/>
-              <a:t>Background : </a:t>
-            </a:r>
-            <a:r>
-              <a:rPr lang="en-US" b="0" dirty="0"/>
-              <a:t>ORB-SLAM2</a:t>
-            </a:r>
-          </a:p>
-          <a:p>
-            <a:pPr marL="342900" indent="-342900">
-              <a:buFont typeface="Courier New" panose="02070309020205020404" pitchFamily="49" charset="0"/>
-              <a:buChar char="o"/>
-            </a:pPr>
-            <a:r>
-              <a:rPr lang="en-US" dirty="0"/>
-              <a:t>RTAB-Map Vs. ORB-SLAM2</a:t>
-            </a:r>
-          </a:p>
-          <a:p>
-            <a:pPr marL="342900" indent="-342900">
-              <a:buFont typeface="Courier New" panose="02070309020205020404" pitchFamily="49" charset="0"/>
-              <a:buChar char="o"/>
-            </a:pPr>
-            <a:r>
-              <a:rPr lang="en-US" dirty="0"/>
-              <a:t>Problem Definition</a:t>
-            </a:r>
-          </a:p>
-          <a:p>
-            <a:pPr marL="685800" lvl="1" indent="-342900">
-              <a:buFont typeface="Courier New" panose="02070309020205020404" pitchFamily="49" charset="0"/>
-              <a:buChar char="o"/>
-              <a:tabLst>
-                <a:tab pos="406400" algn="l"/>
-              </a:tabLst>
-            </a:pPr>
-            <a:r>
-              <a:rPr lang="en-US" b="0" dirty="0"/>
-              <a:t>Revisiting</a:t>
-            </a:r>
-          </a:p>
-          <a:p>
-            <a:pPr marL="342900" indent="-342900">
-              <a:buFont typeface="Courier New" panose="02070309020205020404" pitchFamily="49" charset="0"/>
-              <a:buChar char="o"/>
-            </a:pPr>
-            <a:r>
-              <a:rPr lang="en-US" dirty="0"/>
-              <a:t>System Block Diagram</a:t>
-            </a:r>
-          </a:p>
-          <a:p>
-            <a:pPr marL="685800" lvl="1" indent="-342900">
-              <a:buFont typeface="Courier New" panose="02070309020205020404" pitchFamily="49" charset="0"/>
-              <a:buChar char="o"/>
-            </a:pPr>
-            <a:r>
-              <a:rPr lang="en-US" b="0" dirty="0"/>
-              <a:t>Abstract Integration Structure</a:t>
-            </a:r>
-          </a:p>
-          <a:p>
-            <a:pPr marL="685800" lvl="1" indent="-342900">
-              <a:buFont typeface="Courier New" panose="02070309020205020404" pitchFamily="49" charset="0"/>
-              <a:buChar char="o"/>
-            </a:pPr>
-            <a:r>
-              <a:rPr lang="en-US" b="0" dirty="0"/>
-              <a:t>Detailed Block Diagram</a:t>
-            </a:r>
-          </a:p>
-          <a:p>
-            <a:pPr marL="342900" indent="-342900">
-              <a:buFont typeface="Courier New" panose="02070309020205020404" pitchFamily="49" charset="0"/>
-              <a:buChar char="o"/>
-            </a:pPr>
-            <a:r>
-              <a:rPr lang="en-US" dirty="0"/>
-              <a:t>Initial Baseline Results</a:t>
-            </a:r>
-          </a:p>
-          <a:p>
-            <a:pPr marL="682625" lvl="1" indent="-342900">
-              <a:buFont typeface="Courier New" panose="02070309020205020404" pitchFamily="49" charset="0"/>
-              <a:buChar char="o"/>
-            </a:pPr>
-            <a:r>
-              <a:rPr lang="en-US" b="0" dirty="0"/>
-              <a:t>KITTI &amp; TUM datasets Results</a:t>
-            </a:r>
-          </a:p>
-          <a:p>
-            <a:pPr marL="682625" lvl="1" indent="-342900">
-              <a:buFont typeface="Courier New" panose="02070309020205020404" pitchFamily="49" charset="0"/>
-              <a:buChar char="o"/>
-            </a:pPr>
-            <a:r>
-              <a:rPr lang="en-US" b="0" dirty="0"/>
-              <a:t>Discussion</a:t>
-            </a:r>
-          </a:p>
-          <a:p>
-            <a:pPr marL="342900" indent="-342900">
-              <a:buFont typeface="Courier New" panose="02070309020205020404" pitchFamily="49" charset="0"/>
-              <a:buChar char="o"/>
-            </a:pPr>
-            <a:r>
-              <a:rPr lang="en-US" dirty="0"/>
-              <a:t>Open Questions</a:t>
-            </a:r>
-          </a:p>
-        </p:txBody>
-      </p:sp>
-      <p:sp>
-        <p:nvSpPr>
-          <p:cNvPr id="12" name="Title 11">
-            <a:extLst>
-              <a:ext uri="{FF2B5EF4-FFF2-40B4-BE49-F238E27FC236}">
-                <a16:creationId xmlns:a16="http://schemas.microsoft.com/office/drawing/2014/main" id="{2DD2AFE4-63BE-45E4-B15C-024DB8D8D5D6}"/>
-              </a:ext>
-            </a:extLst>
-          </p:cNvPr>
-          <p:cNvSpPr>
-            <a:spLocks noGrp="1"/>
-          </p:cNvSpPr>
-          <p:nvPr>
-            <p:ph type="title"/>
-          </p:nvPr>
-        </p:nvSpPr>
-        <p:spPr/>
-        <p:txBody>
-          <a:bodyPr/>
-          <a:lstStyle/>
-          <a:p>
-            <a:r>
-              <a:rPr lang="en-US" dirty="0"/>
-              <a:t>Agenda</a:t>
-            </a:r>
-          </a:p>
-        </p:txBody>
-      </p:sp>
-    </p:spTree>
-    <p:extLst>
-      <p:ext uri="{BB962C8B-B14F-4D97-AF65-F5344CB8AC3E}">
-        <p14:creationId xmlns:p14="http://schemas.microsoft.com/office/powerpoint/2010/main" val="2822485740"/>
       </p:ext>
     </p:extLst>
   </p:cSld>
@@ -13524,6 +14690,326 @@
           <a:bodyPr/>
           <a:lstStyle/>
           <a:p>
+            <a:pPr marL="342900" indent="-342900">
+              <a:buFont typeface="Arial" panose="020B0604020202020204" pitchFamily="34" charset="0"/>
+              <a:buChar char="•"/>
+            </a:pPr>
+            <a:r>
+              <a:rPr lang="en-US" dirty="0"/>
+              <a:t>A number of studies were conducted to compare SLAM systems including ORB-SLAM 1&amp;2 and RTAB-Map:</a:t>
+            </a:r>
+          </a:p>
+          <a:p>
+            <a:pPr algn="just"/>
+            <a:r>
+              <a:rPr lang="en-US" sz="1200" b="0" dirty="0">
+                <a:latin typeface="Arial Narrow" panose="020B0606020202030204" pitchFamily="34" charset="0"/>
+              </a:rPr>
+              <a:t>[1] </a:t>
+            </a:r>
+            <a:r>
+              <a:rPr lang="en-US" sz="1200" b="0" dirty="0" err="1">
+                <a:latin typeface="Arial Narrow" panose="020B0606020202030204" pitchFamily="34" charset="0"/>
+              </a:rPr>
+              <a:t>Ragot</a:t>
+            </a:r>
+            <a:r>
+              <a:rPr lang="en-US" sz="1200" b="0" dirty="0">
+                <a:latin typeface="Arial Narrow" panose="020B0606020202030204" pitchFamily="34" charset="0"/>
+              </a:rPr>
+              <a:t>, N., </a:t>
+            </a:r>
+            <a:r>
+              <a:rPr lang="en-US" sz="1200" b="0" dirty="0" err="1">
+                <a:latin typeface="Arial Narrow" panose="020B0606020202030204" pitchFamily="34" charset="0"/>
+              </a:rPr>
+              <a:t>Khemmar</a:t>
+            </a:r>
+            <a:r>
+              <a:rPr lang="en-US" sz="1200" b="0" dirty="0">
+                <a:latin typeface="Arial Narrow" panose="020B0606020202030204" pitchFamily="34" charset="0"/>
+              </a:rPr>
+              <a:t>, R., </a:t>
+            </a:r>
+            <a:r>
+              <a:rPr lang="en-US" sz="1200" b="0" dirty="0" err="1">
+                <a:latin typeface="Arial Narrow" panose="020B0606020202030204" pitchFamily="34" charset="0"/>
+              </a:rPr>
+              <a:t>Pokala</a:t>
+            </a:r>
+            <a:r>
+              <a:rPr lang="en-US" sz="1200" b="0" dirty="0">
+                <a:latin typeface="Arial Narrow" panose="020B0606020202030204" pitchFamily="34" charset="0"/>
+              </a:rPr>
+              <a:t>, A., Rossi, R., &amp; </a:t>
+            </a:r>
+            <a:r>
+              <a:rPr lang="en-US" sz="1200" b="0" dirty="0" err="1">
+                <a:latin typeface="Arial Narrow" panose="020B0606020202030204" pitchFamily="34" charset="0"/>
+              </a:rPr>
+              <a:t>Ertaud</a:t>
+            </a:r>
+            <a:r>
+              <a:rPr lang="en-US" sz="1200" b="0" dirty="0">
+                <a:latin typeface="Arial Narrow" panose="020B0606020202030204" pitchFamily="34" charset="0"/>
+              </a:rPr>
+              <a:t>, J. Y. (2019, July). Benchmark of Visual SLAM Algorithms: ORB-SLAM2 vs RTAB-Map. In </a:t>
+            </a:r>
+            <a:r>
+              <a:rPr lang="en-US" sz="1200" b="0" i="1" dirty="0">
+                <a:latin typeface="Arial Narrow" panose="020B0606020202030204" pitchFamily="34" charset="0"/>
+              </a:rPr>
+              <a:t>2019 Eighth International Conference on Emerging Security Technologies (EST)</a:t>
+            </a:r>
+            <a:r>
+              <a:rPr lang="en-US" sz="1200" b="0" dirty="0">
+                <a:latin typeface="Arial Narrow" panose="020B0606020202030204" pitchFamily="34" charset="0"/>
+              </a:rPr>
+              <a:t> (pp. 1-6). IEEE.</a:t>
+            </a:r>
+          </a:p>
+          <a:p>
+            <a:pPr algn="just"/>
+            <a:r>
+              <a:rPr lang="en-US" sz="1200" b="0" dirty="0">
+                <a:latin typeface="Arial Narrow" panose="020B0606020202030204" pitchFamily="34" charset="0"/>
+              </a:rPr>
+              <a:t>[2] </a:t>
+            </a:r>
+            <a:r>
+              <a:rPr lang="en-US" sz="1200" b="0" dirty="0" err="1">
+                <a:latin typeface="Arial Narrow" panose="020B0606020202030204" pitchFamily="34" charset="0"/>
+              </a:rPr>
+              <a:t>Giubilato</a:t>
+            </a:r>
+            <a:r>
+              <a:rPr lang="en-US" sz="1200" b="0" dirty="0">
+                <a:latin typeface="Arial Narrow" panose="020B0606020202030204" pitchFamily="34" charset="0"/>
+              </a:rPr>
+              <a:t>, R., </a:t>
+            </a:r>
+            <a:r>
+              <a:rPr lang="en-US" sz="1200" b="0" dirty="0" err="1">
+                <a:latin typeface="Arial Narrow" panose="020B0606020202030204" pitchFamily="34" charset="0"/>
+              </a:rPr>
+              <a:t>Chiodini</a:t>
+            </a:r>
+            <a:r>
+              <a:rPr lang="en-US" sz="1200" b="0" dirty="0">
+                <a:latin typeface="Arial Narrow" panose="020B0606020202030204" pitchFamily="34" charset="0"/>
+              </a:rPr>
+              <a:t>, S., </a:t>
+            </a:r>
+            <a:r>
+              <a:rPr lang="en-US" sz="1200" b="0" dirty="0" err="1">
+                <a:latin typeface="Arial Narrow" panose="020B0606020202030204" pitchFamily="34" charset="0"/>
+              </a:rPr>
+              <a:t>Pertile</a:t>
+            </a:r>
+            <a:r>
+              <a:rPr lang="en-US" sz="1200" b="0" dirty="0">
+                <a:latin typeface="Arial Narrow" panose="020B0606020202030204" pitchFamily="34" charset="0"/>
+              </a:rPr>
+              <a:t>, M., &amp; </a:t>
+            </a:r>
+            <a:r>
+              <a:rPr lang="en-US" sz="1200" b="0" dirty="0" err="1">
+                <a:latin typeface="Arial Narrow" panose="020B0606020202030204" pitchFamily="34" charset="0"/>
+              </a:rPr>
+              <a:t>Debei</a:t>
+            </a:r>
+            <a:r>
+              <a:rPr lang="en-US" sz="1200" b="0" dirty="0">
+                <a:latin typeface="Arial Narrow" panose="020B0606020202030204" pitchFamily="34" charset="0"/>
+              </a:rPr>
+              <a:t>, S. (2018, June). An experimental comparison of </a:t>
+            </a:r>
+            <a:r>
+              <a:rPr lang="en-US" sz="1200" b="0" dirty="0" err="1">
+                <a:latin typeface="Arial Narrow" panose="020B0606020202030204" pitchFamily="34" charset="0"/>
+              </a:rPr>
+              <a:t>ros</a:t>
+            </a:r>
+            <a:r>
+              <a:rPr lang="en-US" sz="1200" b="0" dirty="0">
+                <a:latin typeface="Arial Narrow" panose="020B0606020202030204" pitchFamily="34" charset="0"/>
+              </a:rPr>
+              <a:t>-compatible stereo visual slam methods for planetary rovers. In </a:t>
+            </a:r>
+            <a:r>
+              <a:rPr lang="en-US" sz="1200" b="0" i="1" dirty="0">
+                <a:latin typeface="Arial Narrow" panose="020B0606020202030204" pitchFamily="34" charset="0"/>
+              </a:rPr>
+              <a:t>2018 5th IEEE International Workshop on Metrology for </a:t>
+            </a:r>
+            <a:r>
+              <a:rPr lang="en-US" sz="1200" b="0" i="1" dirty="0" err="1">
+                <a:latin typeface="Arial Narrow" panose="020B0606020202030204" pitchFamily="34" charset="0"/>
+              </a:rPr>
+              <a:t>AeroSpace</a:t>
+            </a:r>
+            <a:r>
+              <a:rPr lang="en-US" sz="1200" b="0" i="1" dirty="0">
+                <a:latin typeface="Arial Narrow" panose="020B0606020202030204" pitchFamily="34" charset="0"/>
+              </a:rPr>
+              <a:t> (</a:t>
+            </a:r>
+            <a:r>
+              <a:rPr lang="en-US" sz="1200" b="0" i="1" dirty="0" err="1">
+                <a:latin typeface="Arial Narrow" panose="020B0606020202030204" pitchFamily="34" charset="0"/>
+              </a:rPr>
+              <a:t>MetroAeroSpace</a:t>
+            </a:r>
+            <a:r>
+              <a:rPr lang="en-US" sz="1200" b="0" i="1" dirty="0">
+                <a:latin typeface="Arial Narrow" panose="020B0606020202030204" pitchFamily="34" charset="0"/>
+              </a:rPr>
+              <a:t>)</a:t>
+            </a:r>
+            <a:r>
+              <a:rPr lang="en-US" sz="1200" b="0" dirty="0">
+                <a:latin typeface="Arial Narrow" panose="020B0606020202030204" pitchFamily="34" charset="0"/>
+              </a:rPr>
+              <a:t> (pp. 386-391). IEEE.</a:t>
+            </a:r>
+          </a:p>
+          <a:p>
+            <a:pPr algn="just"/>
+            <a:r>
+              <a:rPr lang="en-US" sz="1200" b="0" dirty="0">
+                <a:latin typeface="Arial Narrow" panose="020B0606020202030204" pitchFamily="34" charset="0"/>
+              </a:rPr>
+              <a:t>[3] Filipenko, M., &amp; </a:t>
+            </a:r>
+            <a:r>
+              <a:rPr lang="en-US" sz="1200" b="0" dirty="0" err="1">
+                <a:latin typeface="Arial Narrow" panose="020B0606020202030204" pitchFamily="34" charset="0"/>
+              </a:rPr>
+              <a:t>Afanasyev</a:t>
+            </a:r>
+            <a:r>
+              <a:rPr lang="en-US" sz="1200" b="0" dirty="0">
+                <a:latin typeface="Arial Narrow" panose="020B0606020202030204" pitchFamily="34" charset="0"/>
+              </a:rPr>
+              <a:t>, I. (2018, September). Comparison of various slam systems for mobile robot in an indoor environment. In </a:t>
+            </a:r>
+            <a:r>
+              <a:rPr lang="en-US" sz="1200" b="0" i="1" dirty="0">
+                <a:latin typeface="Arial Narrow" panose="020B0606020202030204" pitchFamily="34" charset="0"/>
+              </a:rPr>
+              <a:t>2018 International Conference on Intelligent Systems (IS)</a:t>
+            </a:r>
+            <a:r>
+              <a:rPr lang="en-US" sz="1200" b="0" dirty="0">
+                <a:latin typeface="Arial Narrow" panose="020B0606020202030204" pitchFamily="34" charset="0"/>
+              </a:rPr>
+              <a:t> (pp. 400-407). IEEE.</a:t>
+            </a:r>
+          </a:p>
+          <a:p>
+            <a:pPr algn="just"/>
+            <a:r>
+              <a:rPr lang="en-US" sz="1200" b="0" dirty="0">
+                <a:latin typeface="Arial Narrow" panose="020B0606020202030204" pitchFamily="34" charset="0"/>
+              </a:rPr>
+              <a:t>[4] </a:t>
+            </a:r>
+            <a:r>
+              <a:rPr lang="en-US" sz="1200" b="0" dirty="0" err="1">
+                <a:latin typeface="Arial Narrow" panose="020B0606020202030204" pitchFamily="34" charset="0"/>
+              </a:rPr>
+              <a:t>Ibragimov</a:t>
+            </a:r>
+            <a:r>
+              <a:rPr lang="en-US" sz="1200" b="0" dirty="0">
+                <a:latin typeface="Arial Narrow" panose="020B0606020202030204" pitchFamily="34" charset="0"/>
+              </a:rPr>
+              <a:t>, I. Z., &amp; </a:t>
+            </a:r>
+            <a:r>
+              <a:rPr lang="en-US" sz="1200" b="0" dirty="0" err="1">
+                <a:latin typeface="Arial Narrow" panose="020B0606020202030204" pitchFamily="34" charset="0"/>
+              </a:rPr>
+              <a:t>Afanasyev</a:t>
+            </a:r>
+            <a:r>
+              <a:rPr lang="en-US" sz="1200" b="0" dirty="0">
+                <a:latin typeface="Arial Narrow" panose="020B0606020202030204" pitchFamily="34" charset="0"/>
+              </a:rPr>
+              <a:t>, I. M. (2017, October). Comparison of </a:t>
+            </a:r>
+            <a:r>
+              <a:rPr lang="en-US" sz="1200" b="0" dirty="0" err="1">
+                <a:latin typeface="Arial Narrow" panose="020B0606020202030204" pitchFamily="34" charset="0"/>
+              </a:rPr>
+              <a:t>ros</a:t>
+            </a:r>
+            <a:r>
+              <a:rPr lang="en-US" sz="1200" b="0" dirty="0">
+                <a:latin typeface="Arial Narrow" panose="020B0606020202030204" pitchFamily="34" charset="0"/>
+              </a:rPr>
+              <a:t>-based visual slam methods in homogeneous indoor environment. In </a:t>
+            </a:r>
+            <a:r>
+              <a:rPr lang="en-US" sz="1200" b="0" i="1" dirty="0">
+                <a:latin typeface="Arial Narrow" panose="020B0606020202030204" pitchFamily="34" charset="0"/>
+              </a:rPr>
+              <a:t>2017 14th Workshop on Positioning, Navigation and Communications (WPNC)</a:t>
+            </a:r>
+            <a:r>
+              <a:rPr lang="en-US" sz="1200" b="0" dirty="0">
+                <a:latin typeface="Arial Narrow" panose="020B0606020202030204" pitchFamily="34" charset="0"/>
+              </a:rPr>
+              <a:t> (pp. 1-6). IEEE.</a:t>
+            </a:r>
+          </a:p>
+          <a:p>
+            <a:pPr algn="just"/>
+            <a:r>
+              <a:rPr lang="en-US" sz="1200" b="0" dirty="0">
+                <a:latin typeface="Arial Narrow" panose="020B0606020202030204" pitchFamily="34" charset="0"/>
+              </a:rPr>
+              <a:t>[5] da Silva, B. M., Xavier, R. S., do Nascimento, T. P., &amp; Gonsalves, L. M. (2017, November). Experimental evaluation of ROS compatible SLAM algorithms for RGB-D sensors. In </a:t>
+            </a:r>
+            <a:r>
+              <a:rPr lang="en-US" sz="1200" b="0" i="1" dirty="0">
+                <a:latin typeface="Arial Narrow" panose="020B0606020202030204" pitchFamily="34" charset="0"/>
+              </a:rPr>
+              <a:t>2017 Latin American Robotics Symposium (LARS) and 2017 Brazilian Symposium on Robotics (SBR)</a:t>
+            </a:r>
+            <a:r>
+              <a:rPr lang="en-US" sz="1200" b="0" dirty="0">
+                <a:latin typeface="Arial Narrow" panose="020B0606020202030204" pitchFamily="34" charset="0"/>
+              </a:rPr>
+              <a:t> (pp. 1-6). IEEE.</a:t>
+            </a:r>
+          </a:p>
+          <a:p>
+            <a:pPr algn="just"/>
+            <a:r>
+              <a:rPr lang="en-US" sz="1200" b="0" dirty="0">
+                <a:latin typeface="Arial Narrow" panose="020B0606020202030204" pitchFamily="34" charset="0"/>
+              </a:rPr>
+              <a:t>[6] Gaspar, A. R., Nunes, A., Pinto, A., &amp; Matos, A. (2017, November). Comparative Study of Visual Odometry and SLAM Techniques. In </a:t>
+            </a:r>
+            <a:r>
+              <a:rPr lang="en-US" sz="1200" b="0" i="1" dirty="0">
+                <a:latin typeface="Arial Narrow" panose="020B0606020202030204" pitchFamily="34" charset="0"/>
+              </a:rPr>
+              <a:t>Iberian Robotics conference</a:t>
+            </a:r>
+            <a:r>
+              <a:rPr lang="en-US" sz="1200" b="0" dirty="0">
+                <a:latin typeface="Arial Narrow" panose="020B0606020202030204" pitchFamily="34" charset="0"/>
+              </a:rPr>
+              <a:t> (pp. 463-474). Springer, Cham.</a:t>
+            </a:r>
+          </a:p>
+          <a:p>
+            <a:pPr marL="342900" indent="-342900">
+              <a:buFont typeface="Arial" panose="020B0604020202020204" pitchFamily="34" charset="0"/>
+              <a:buChar char="•"/>
+            </a:pPr>
             <a:endParaRPr lang="en-US" dirty="0"/>
           </a:p>
         </p:txBody>
@@ -13591,7 +15077,7 @@
           <p:cNvPr id="2" name="Text Placeholder 1">
             <a:extLst>
               <a:ext uri="{FF2B5EF4-FFF2-40B4-BE49-F238E27FC236}">
-                <a16:creationId xmlns:a16="http://schemas.microsoft.com/office/drawing/2014/main" id="{AAE18D23-CCCF-4B54-8D8C-73CF496E2FB3}"/>
+                <a16:creationId xmlns:a16="http://schemas.microsoft.com/office/drawing/2014/main" id="{D72E0B0E-2E5F-4BB3-95A9-40BD5F1F3929}"/>
               </a:ext>
             </a:extLst>
           </p:cNvPr>
@@ -13613,55 +15099,313 @@
             </a:pPr>
             <a:r>
               <a:rPr lang="en-US" dirty="0"/>
-              <a:t>Both </a:t>
-            </a:r>
-            <a:r>
-              <a:rPr lang="en-US" dirty="0">
-                <a:solidFill>
-                  <a:srgbClr val="00B050"/>
-                </a:solidFill>
+              <a:t>A number of studies were conducted to compare SLAM systems including ORB-SLAM 1&amp;2 and RTAB-Map:</a:t>
+            </a:r>
+          </a:p>
+          <a:p>
+            <a:pPr algn="just"/>
+            <a:r>
+              <a:rPr lang="en-US" sz="1200" b="0" dirty="0">
+                <a:latin typeface="Arial Narrow" panose="020B0606020202030204" pitchFamily="34" charset="0"/>
               </a:rPr>
-              <a:t>ORB-SLAM2</a:t>
-            </a:r>
-            <a:r>
-              <a:rPr lang="en-US" dirty="0"/>
-              <a:t> and </a:t>
-            </a:r>
-            <a:r>
-              <a:rPr lang="en-US" dirty="0">
-                <a:solidFill>
-                  <a:srgbClr val="00B050"/>
-                </a:solidFill>
+              <a:t>[1] </a:t>
+            </a:r>
+            <a:r>
+              <a:rPr lang="en-US" sz="1200" b="0" dirty="0" err="1">
+                <a:latin typeface="Arial Narrow" panose="020B0606020202030204" pitchFamily="34" charset="0"/>
               </a:rPr>
-              <a:t>RTAB-Map</a:t>
-            </a:r>
-            <a:r>
-              <a:rPr lang="en-US" dirty="0"/>
-              <a:t> are state-of-the-art SLAM algorithms </a:t>
-            </a:r>
-            <a:r>
-              <a:rPr lang="en-US" dirty="0">
-                <a:solidFill>
-                  <a:srgbClr val="00B050"/>
-                </a:solidFill>
+              <a:t>Ragot</a:t>
+            </a:r>
+            <a:r>
+              <a:rPr lang="en-US" sz="1200" b="0" dirty="0">
+                <a:latin typeface="Arial Narrow" panose="020B0606020202030204" pitchFamily="34" charset="0"/>
               </a:rPr>
-              <a:t>but each has performance issues under certain conditions</a:t>
-            </a:r>
-            <a:r>
-              <a:rPr lang="en-US" dirty="0"/>
-              <a:t> due to </a:t>
-            </a:r>
-            <a:r>
-              <a:rPr lang="en-US" dirty="0">
-                <a:solidFill>
-                  <a:srgbClr val="00B050"/>
-                </a:solidFill>
+              <a:t>, N., </a:t>
+            </a:r>
+            <a:r>
+              <a:rPr lang="en-US" sz="1200" b="0" dirty="0" err="1">
+                <a:latin typeface="Arial Narrow" panose="020B0606020202030204" pitchFamily="34" charset="0"/>
               </a:rPr>
-              <a:t>its architecture</a:t>
-            </a:r>
-            <a:r>
-              <a:rPr lang="en-US" dirty="0"/>
-              <a:t>. </a:t>
+              <a:t>Khemmar</a:t>
+            </a:r>
+            <a:r>
+              <a:rPr lang="en-US" sz="1200" b="0" dirty="0">
+                <a:latin typeface="Arial Narrow" panose="020B0606020202030204" pitchFamily="34" charset="0"/>
+              </a:rPr>
+              <a:t>, R., </a:t>
+            </a:r>
+            <a:r>
+              <a:rPr lang="en-US" sz="1200" b="0" dirty="0" err="1">
+                <a:latin typeface="Arial Narrow" panose="020B0606020202030204" pitchFamily="34" charset="0"/>
+              </a:rPr>
+              <a:t>Pokala</a:t>
+            </a:r>
+            <a:r>
+              <a:rPr lang="en-US" sz="1200" b="0" dirty="0">
+                <a:latin typeface="Arial Narrow" panose="020B0606020202030204" pitchFamily="34" charset="0"/>
+              </a:rPr>
+              <a:t>, A., Rossi, R., &amp; </a:t>
+            </a:r>
+            <a:r>
+              <a:rPr lang="en-US" sz="1200" b="0" dirty="0" err="1">
+                <a:latin typeface="Arial Narrow" panose="020B0606020202030204" pitchFamily="34" charset="0"/>
+              </a:rPr>
+              <a:t>Ertaud</a:t>
+            </a:r>
+            <a:r>
+              <a:rPr lang="en-US" sz="1200" b="0" dirty="0">
+                <a:latin typeface="Arial Narrow" panose="020B0606020202030204" pitchFamily="34" charset="0"/>
+              </a:rPr>
+              <a:t>, J. Y. (2019, July). Benchmark of Visual SLAM Algorithms: ORB-SLAM2 vs RTAB-Map. In </a:t>
+            </a:r>
+            <a:r>
+              <a:rPr lang="en-US" sz="1200" b="0" i="1" dirty="0">
+                <a:latin typeface="Arial Narrow" panose="020B0606020202030204" pitchFamily="34" charset="0"/>
+              </a:rPr>
+              <a:t>2019 Eighth International Conference on Emerging Security Technologies (EST)</a:t>
+            </a:r>
+            <a:r>
+              <a:rPr lang="en-US" sz="1200" b="0" dirty="0">
+                <a:latin typeface="Arial Narrow" panose="020B0606020202030204" pitchFamily="34" charset="0"/>
+              </a:rPr>
+              <a:t> (pp. 1-6). IEEE.</a:t>
+            </a:r>
+          </a:p>
+          <a:p>
+            <a:pPr algn="just"/>
+            <a:r>
+              <a:rPr lang="en-US" sz="1200" b="0" dirty="0">
+                <a:latin typeface="Arial Narrow" panose="020B0606020202030204" pitchFamily="34" charset="0"/>
+              </a:rPr>
+              <a:t>[2] </a:t>
+            </a:r>
+            <a:r>
+              <a:rPr lang="en-US" sz="1200" b="0" dirty="0" err="1">
+                <a:latin typeface="Arial Narrow" panose="020B0606020202030204" pitchFamily="34" charset="0"/>
+              </a:rPr>
+              <a:t>Giubilato</a:t>
+            </a:r>
+            <a:r>
+              <a:rPr lang="en-US" sz="1200" b="0" dirty="0">
+                <a:latin typeface="Arial Narrow" panose="020B0606020202030204" pitchFamily="34" charset="0"/>
+              </a:rPr>
+              <a:t>, R., </a:t>
+            </a:r>
+            <a:r>
+              <a:rPr lang="en-US" sz="1200" b="0" dirty="0" err="1">
+                <a:latin typeface="Arial Narrow" panose="020B0606020202030204" pitchFamily="34" charset="0"/>
+              </a:rPr>
+              <a:t>Chiodini</a:t>
+            </a:r>
+            <a:r>
+              <a:rPr lang="en-US" sz="1200" b="0" dirty="0">
+                <a:latin typeface="Arial Narrow" panose="020B0606020202030204" pitchFamily="34" charset="0"/>
+              </a:rPr>
+              <a:t>, S., </a:t>
+            </a:r>
+            <a:r>
+              <a:rPr lang="en-US" sz="1200" b="0" dirty="0" err="1">
+                <a:latin typeface="Arial Narrow" panose="020B0606020202030204" pitchFamily="34" charset="0"/>
+              </a:rPr>
+              <a:t>Pertile</a:t>
+            </a:r>
+            <a:r>
+              <a:rPr lang="en-US" sz="1200" b="0" dirty="0">
+                <a:latin typeface="Arial Narrow" panose="020B0606020202030204" pitchFamily="34" charset="0"/>
+              </a:rPr>
+              <a:t>, M., &amp; </a:t>
+            </a:r>
+            <a:r>
+              <a:rPr lang="en-US" sz="1200" b="0" dirty="0" err="1">
+                <a:latin typeface="Arial Narrow" panose="020B0606020202030204" pitchFamily="34" charset="0"/>
+              </a:rPr>
+              <a:t>Debei</a:t>
+            </a:r>
+            <a:r>
+              <a:rPr lang="en-US" sz="1200" b="0" dirty="0">
+                <a:latin typeface="Arial Narrow" panose="020B0606020202030204" pitchFamily="34" charset="0"/>
+              </a:rPr>
+              <a:t>, S. (2018, June). An experimental comparison of </a:t>
+            </a:r>
+            <a:r>
+              <a:rPr lang="en-US" sz="1200" b="0" dirty="0" err="1">
+                <a:latin typeface="Arial Narrow" panose="020B0606020202030204" pitchFamily="34" charset="0"/>
+              </a:rPr>
+              <a:t>ros</a:t>
+            </a:r>
+            <a:r>
+              <a:rPr lang="en-US" sz="1200" b="0" dirty="0">
+                <a:latin typeface="Arial Narrow" panose="020B0606020202030204" pitchFamily="34" charset="0"/>
+              </a:rPr>
+              <a:t>-compatible stereo visual slam methods for planetary rovers. In </a:t>
+            </a:r>
+            <a:r>
+              <a:rPr lang="en-US" sz="1200" b="0" i="1" dirty="0">
+                <a:latin typeface="Arial Narrow" panose="020B0606020202030204" pitchFamily="34" charset="0"/>
+              </a:rPr>
+              <a:t>2018 5th IEEE International Workshop on Metrology for </a:t>
+            </a:r>
+            <a:r>
+              <a:rPr lang="en-US" sz="1200" b="0" i="1" dirty="0" err="1">
+                <a:latin typeface="Arial Narrow" panose="020B0606020202030204" pitchFamily="34" charset="0"/>
+              </a:rPr>
+              <a:t>AeroSpace</a:t>
+            </a:r>
+            <a:r>
+              <a:rPr lang="en-US" sz="1200" b="0" i="1" dirty="0">
+                <a:latin typeface="Arial Narrow" panose="020B0606020202030204" pitchFamily="34" charset="0"/>
+              </a:rPr>
+              <a:t> (</a:t>
+            </a:r>
+            <a:r>
+              <a:rPr lang="en-US" sz="1200" b="0" i="1" dirty="0" err="1">
+                <a:latin typeface="Arial Narrow" panose="020B0606020202030204" pitchFamily="34" charset="0"/>
+              </a:rPr>
+              <a:t>MetroAeroSpace</a:t>
+            </a:r>
+            <a:r>
+              <a:rPr lang="en-US" sz="1200" b="0" i="1" dirty="0">
+                <a:latin typeface="Arial Narrow" panose="020B0606020202030204" pitchFamily="34" charset="0"/>
+              </a:rPr>
+              <a:t>)</a:t>
+            </a:r>
+            <a:r>
+              <a:rPr lang="en-US" sz="1200" b="0" dirty="0">
+                <a:latin typeface="Arial Narrow" panose="020B0606020202030204" pitchFamily="34" charset="0"/>
+              </a:rPr>
+              <a:t> (pp. 386-391). IEEE.</a:t>
+            </a:r>
+          </a:p>
+          <a:p>
+            <a:pPr algn="just"/>
+            <a:r>
+              <a:rPr lang="en-US" sz="1200" b="0" dirty="0">
+                <a:latin typeface="Arial Narrow" panose="020B0606020202030204" pitchFamily="34" charset="0"/>
+              </a:rPr>
+              <a:t>[3] Filipenko, M., &amp; </a:t>
+            </a:r>
+            <a:r>
+              <a:rPr lang="en-US" sz="1200" b="0" dirty="0" err="1">
+                <a:latin typeface="Arial Narrow" panose="020B0606020202030204" pitchFamily="34" charset="0"/>
+              </a:rPr>
+              <a:t>Afanasyev</a:t>
+            </a:r>
+            <a:r>
+              <a:rPr lang="en-US" sz="1200" b="0" dirty="0">
+                <a:latin typeface="Arial Narrow" panose="020B0606020202030204" pitchFamily="34" charset="0"/>
+              </a:rPr>
+              <a:t>, I. (2018, September). Comparison of various slam systems for mobile robot in an indoor environment. In </a:t>
+            </a:r>
+            <a:r>
+              <a:rPr lang="en-US" sz="1200" b="0" i="1" dirty="0">
+                <a:latin typeface="Arial Narrow" panose="020B0606020202030204" pitchFamily="34" charset="0"/>
+              </a:rPr>
+              <a:t>2018 International Conference on Intelligent Systems (IS)</a:t>
+            </a:r>
+            <a:r>
+              <a:rPr lang="en-US" sz="1200" b="0" dirty="0">
+                <a:latin typeface="Arial Narrow" panose="020B0606020202030204" pitchFamily="34" charset="0"/>
+              </a:rPr>
+              <a:t> (pp. 400-407). IEEE.</a:t>
+            </a:r>
+          </a:p>
+          <a:p>
+            <a:pPr algn="just"/>
+            <a:r>
+              <a:rPr lang="en-US" sz="1200" dirty="0">
+                <a:latin typeface="Arial Narrow" panose="020B0606020202030204" pitchFamily="34" charset="0"/>
+              </a:rPr>
+              <a:t>[4] </a:t>
+            </a:r>
+            <a:r>
+              <a:rPr lang="en-US" sz="1200" dirty="0" err="1">
+                <a:latin typeface="Arial Narrow" panose="020B0606020202030204" pitchFamily="34" charset="0"/>
+              </a:rPr>
+              <a:t>Ibragimov</a:t>
+            </a:r>
+            <a:r>
+              <a:rPr lang="en-US" sz="1200" dirty="0">
+                <a:latin typeface="Arial Narrow" panose="020B0606020202030204" pitchFamily="34" charset="0"/>
+              </a:rPr>
+              <a:t>, I. Z., &amp; </a:t>
+            </a:r>
+            <a:r>
+              <a:rPr lang="en-US" sz="1200" dirty="0" err="1">
+                <a:latin typeface="Arial Narrow" panose="020B0606020202030204" pitchFamily="34" charset="0"/>
+              </a:rPr>
+              <a:t>Afanasyev</a:t>
+            </a:r>
+            <a:r>
+              <a:rPr lang="en-US" sz="1200" dirty="0">
+                <a:latin typeface="Arial Narrow" panose="020B0606020202030204" pitchFamily="34" charset="0"/>
+              </a:rPr>
+              <a:t>, I. M. (2017, October). Comparison of </a:t>
+            </a:r>
+            <a:r>
+              <a:rPr lang="en-US" sz="1200" dirty="0" err="1">
+                <a:latin typeface="Arial Narrow" panose="020B0606020202030204" pitchFamily="34" charset="0"/>
+              </a:rPr>
+              <a:t>ros</a:t>
+            </a:r>
+            <a:r>
+              <a:rPr lang="en-US" sz="1200" dirty="0">
+                <a:latin typeface="Arial Narrow" panose="020B0606020202030204" pitchFamily="34" charset="0"/>
+              </a:rPr>
+              <a:t>-based visual slam methods in homogeneous indoor environment. In </a:t>
+            </a:r>
+            <a:r>
+              <a:rPr lang="en-US" sz="1200" i="1" dirty="0">
+                <a:latin typeface="Arial Narrow" panose="020B0606020202030204" pitchFamily="34" charset="0"/>
+              </a:rPr>
+              <a:t>2017 14th Workshop on Positioning, Navigation and Communications (WPNC)</a:t>
+            </a:r>
+            <a:r>
+              <a:rPr lang="en-US" sz="1200" dirty="0">
+                <a:latin typeface="Arial Narrow" panose="020B0606020202030204" pitchFamily="34" charset="0"/>
+              </a:rPr>
+              <a:t> (pp. 1-6). IEEE.</a:t>
+            </a:r>
+          </a:p>
+          <a:p>
+            <a:pPr algn="just"/>
+            <a:r>
+              <a:rPr lang="en-US" sz="1200" b="0" dirty="0">
+                <a:latin typeface="Arial Narrow" panose="020B0606020202030204" pitchFamily="34" charset="0"/>
+              </a:rPr>
+              <a:t>[5] da Silva, B. M., Xavier, R. S., do Nascimento, T. P., &amp; Gonsalves, L. M. (2017, November). Experimental evaluation of ROS compatible SLAM algorithms for RGB-D sensors. In </a:t>
+            </a:r>
+            <a:r>
+              <a:rPr lang="en-US" sz="1200" b="0" i="1" dirty="0">
+                <a:latin typeface="Arial Narrow" panose="020B0606020202030204" pitchFamily="34" charset="0"/>
+              </a:rPr>
+              <a:t>2017 Latin American Robotics Symposium (LARS) and 2017 Brazilian Symposium on Robotics (SBR)</a:t>
+            </a:r>
+            <a:r>
+              <a:rPr lang="en-US" sz="1200" b="0" dirty="0">
+                <a:latin typeface="Arial Narrow" panose="020B0606020202030204" pitchFamily="34" charset="0"/>
+              </a:rPr>
+              <a:t> (pp. 1-6). IEEE.</a:t>
+            </a:r>
+          </a:p>
+          <a:p>
+            <a:pPr algn="just"/>
+            <a:r>
+              <a:rPr lang="en-US" sz="1200" dirty="0">
+                <a:latin typeface="Arial Narrow" panose="020B0606020202030204" pitchFamily="34" charset="0"/>
+              </a:rPr>
+              <a:t>[6] Gaspar, A. R., Nunes, A., Pinto, A., &amp; Matos, A. (2017, November). Comparative Study of Visual Odometry and SLAM Techniques. In </a:t>
+            </a:r>
+            <a:r>
+              <a:rPr lang="en-US" sz="1200" i="1" dirty="0">
+                <a:latin typeface="Arial Narrow" panose="020B0606020202030204" pitchFamily="34" charset="0"/>
+              </a:rPr>
+              <a:t>Iberian Robotics conference</a:t>
+            </a:r>
+            <a:r>
+              <a:rPr lang="en-US" sz="1200" dirty="0">
+                <a:latin typeface="Arial Narrow" panose="020B0606020202030204" pitchFamily="34" charset="0"/>
+              </a:rPr>
+              <a:t> (pp. 463-474). Springer, Cham.</a:t>
             </a:r>
           </a:p>
           <a:p>
@@ -13671,93 +15415,6 @@
             </a:pPr>
             <a:endParaRPr lang="en-US" dirty="0"/>
           </a:p>
-          <a:p>
-            <a:pPr marL="342900" indent="-342900">
-              <a:buFont typeface="Arial" panose="020B0604020202020204" pitchFamily="34" charset="0"/>
-              <a:buChar char="•"/>
-            </a:pPr>
-            <a:r>
-              <a:rPr lang="en-US" dirty="0"/>
-              <a:t>ORB-SLAM2 optimizes </a:t>
-            </a:r>
-            <a:r>
-              <a:rPr lang="en-US" dirty="0">
-                <a:solidFill>
-                  <a:srgbClr val="00B050"/>
-                </a:solidFill>
-              </a:rPr>
-              <a:t>both camera poses and map points </a:t>
-            </a:r>
-            <a:r>
-              <a:rPr lang="en-US" dirty="0"/>
-              <a:t>(2 levels of optimization) while RTAB-Map only optimize</a:t>
-            </a:r>
-            <a:r>
-              <a:rPr lang="en-US" dirty="0">
-                <a:solidFill>
-                  <a:srgbClr val="00B050"/>
-                </a:solidFill>
-              </a:rPr>
-              <a:t> camera poses</a:t>
-            </a:r>
-            <a:r>
-              <a:rPr lang="en-US" dirty="0"/>
-              <a:t>.</a:t>
-            </a:r>
-          </a:p>
-          <a:p>
-            <a:pPr marL="342900" indent="-342900">
-              <a:buFont typeface="Arial" panose="020B0604020202020204" pitchFamily="34" charset="0"/>
-              <a:buChar char="•"/>
-            </a:pPr>
-            <a:endParaRPr lang="en-US" dirty="0"/>
-          </a:p>
-          <a:p>
-            <a:pPr marL="342900" indent="-342900">
-              <a:buFont typeface="Arial" panose="020B0604020202020204" pitchFamily="34" charset="0"/>
-              <a:buChar char="•"/>
-            </a:pPr>
-            <a:r>
-              <a:rPr lang="en-US" dirty="0"/>
-              <a:t>Integration</a:t>
-            </a:r>
-            <a:r>
-              <a:rPr lang="en-US" dirty="0">
-                <a:solidFill>
-                  <a:srgbClr val="00B050"/>
-                </a:solidFill>
-              </a:rPr>
-              <a:t> </a:t>
-            </a:r>
-            <a:r>
-              <a:rPr lang="en-US" dirty="0"/>
-              <a:t>of both algorithms can yield </a:t>
-            </a:r>
-            <a:r>
-              <a:rPr lang="en-US" dirty="0">
-                <a:solidFill>
-                  <a:srgbClr val="00B050"/>
-                </a:solidFill>
-              </a:rPr>
-              <a:t>more reliable solution</a:t>
-            </a:r>
-            <a:r>
-              <a:rPr lang="en-US" dirty="0"/>
-              <a:t> and can achieve </a:t>
-            </a:r>
-            <a:r>
-              <a:rPr lang="en-US" dirty="0">
-                <a:solidFill>
-                  <a:srgbClr val="00B050"/>
-                </a:solidFill>
-              </a:rPr>
-              <a:t>better performance under wider range of scenarios</a:t>
-            </a:r>
-            <a:r>
-              <a:rPr lang="en-US" dirty="0"/>
-              <a:t>. </a:t>
-            </a:r>
-          </a:p>
         </p:txBody>
       </p:sp>
       <p:sp>
@@ -13765,7 +15422,7 @@
           <p:cNvPr id="3" name="Title 2">
             <a:extLst>
               <a:ext uri="{FF2B5EF4-FFF2-40B4-BE49-F238E27FC236}">
-                <a16:creationId xmlns:a16="http://schemas.microsoft.com/office/drawing/2014/main" id="{FF94E667-1C3D-4043-8FE4-F892B8FE1C65}"/>
+                <a16:creationId xmlns:a16="http://schemas.microsoft.com/office/drawing/2014/main" id="{C0FDF4FF-2BE5-44B4-8A65-D68F78B61F93}"/>
               </a:ext>
             </a:extLst>
           </p:cNvPr>
@@ -13781,23 +15438,17 @@
           <a:bodyPr/>
           <a:lstStyle/>
           <a:p>
-            <a:pPr marL="342900" indent="-342900"/>
             <a:r>
               <a:rPr lang="en-US" dirty="0"/>
-              <a:t>Problem Definition: </a:t>
-            </a:r>
-            <a:r>
-              <a:rPr lang="en-US" b="0" dirty="0"/>
-              <a:t>Revisiting</a:t>
-            </a:r>
-            <a:endParaRPr lang="en-US" dirty="0"/>
+              <a:t>RTAB-Map Vs. ORB-SLAM2</a:t>
+            </a:r>
           </a:p>
         </p:txBody>
       </p:sp>
     </p:spTree>
     <p:extLst>
       <p:ext uri="{BB962C8B-B14F-4D97-AF65-F5344CB8AC3E}">
-        <p14:creationId xmlns:p14="http://schemas.microsoft.com/office/powerpoint/2010/main" val="924476771"/>
+        <p14:creationId xmlns:p14="http://schemas.microsoft.com/office/powerpoint/2010/main" val="362658725"/>
       </p:ext>
     </p:extLst>
   </p:cSld>
@@ -13829,7 +15480,7 @@
           <p:cNvPr id="2" name="Text Placeholder 1">
             <a:extLst>
               <a:ext uri="{FF2B5EF4-FFF2-40B4-BE49-F238E27FC236}">
-                <a16:creationId xmlns:a16="http://schemas.microsoft.com/office/drawing/2014/main" id="{A486BDD8-C15B-451E-A593-40D405E1193E}"/>
+                <a16:creationId xmlns:a16="http://schemas.microsoft.com/office/drawing/2014/main" id="{D72E0B0E-2E5F-4BB3-95A9-40BD5F1F3929}"/>
               </a:ext>
             </a:extLst>
           </p:cNvPr>
@@ -13851,27 +15502,27 @@
             </a:pPr>
             <a:r>
               <a:rPr lang="en-US" dirty="0"/>
-              <a:t>In a nutshell, we are trying to </a:t>
-            </a:r>
-            <a:r>
-              <a:rPr lang="en-US" dirty="0">
-                <a:solidFill>
-                  <a:srgbClr val="00B050"/>
-                </a:solidFill>
-              </a:rPr>
-              <a:t>utilize the optimized map points from ORB-SLAM2</a:t>
-            </a:r>
-            <a:r>
-              <a:rPr lang="en-US" dirty="0"/>
-              <a:t> in RTAB-Map in order to </a:t>
-            </a:r>
-            <a:r>
-              <a:rPr lang="en-US" dirty="0">
-                <a:solidFill>
-                  <a:srgbClr val="00B050"/>
-                </a:solidFill>
-              </a:rPr>
-              <a:t>enhance its accuracy.</a:t>
+              <a:t>Setup:</a:t>
+            </a:r>
+          </a:p>
+          <a:p>
+            <a:pPr marL="685800" lvl="1" indent="-342900">
+              <a:buFont typeface="Arial" panose="020B0604020202020204" pitchFamily="34" charset="0"/>
+              <a:buChar char="•"/>
+            </a:pPr>
+            <a:r>
+              <a:rPr lang="en-US" b="0" dirty="0"/>
+              <a:t>LRF, monocular camera, stereo camera, Kinect 2.0 depth sensor.</a:t>
+            </a:r>
+          </a:p>
+          <a:p>
+            <a:pPr marL="685800" lvl="1" indent="-342900">
+              <a:buFont typeface="Arial" panose="020B0604020202020204" pitchFamily="34" charset="0"/>
+              <a:buChar char="•"/>
+            </a:pPr>
+            <a:r>
+              <a:rPr lang="en-US" b="0" dirty="0"/>
+              <a:t>Processing was done on mounted laptop device. </a:t>
             </a:r>
           </a:p>
           <a:p>
@@ -13880,26 +15531,71 @@
               <a:buChar char="•"/>
             </a:pPr>
             <a:r>
-              <a:rPr lang="en-US" dirty="0">
-                <a:solidFill>
-                  <a:srgbClr val="00B050"/>
-                </a:solidFill>
-              </a:rPr>
-              <a:t>Input controls are dependent on the dataset under test </a:t>
-            </a:r>
-            <a:r>
               <a:rPr lang="en-US" dirty="0"/>
-              <a:t>(DUT) and is sent to both ORB-SLAM2 and RTAB-Map. </a:t>
-            </a:r>
-            <a:r>
-              <a:rPr lang="en-US" dirty="0">
-                <a:solidFill>
-                  <a:srgbClr val="00B050"/>
-                </a:solidFill>
-              </a:rPr>
-              <a:t> </a:t>
-            </a:r>
-            <a:endParaRPr lang="en-US" dirty="0"/>
+              <a:t>Testing data:</a:t>
+            </a:r>
+          </a:p>
+          <a:p>
+            <a:pPr marL="685800" lvl="1" indent="-342900">
+              <a:buFont typeface="Arial" panose="020B0604020202020204" pitchFamily="34" charset="0"/>
+              <a:buChar char="•"/>
+            </a:pPr>
+            <a:r>
+              <a:rPr lang="en-US" b="0" dirty="0"/>
+              <a:t>Self gathered dataset included navigating the robot along segmented straight lines. </a:t>
+            </a:r>
+          </a:p>
+          <a:p>
+            <a:pPr marL="342900" indent="-342900">
+              <a:buFont typeface="Arial" panose="020B0604020202020204" pitchFamily="34" charset="0"/>
+              <a:buChar char="•"/>
+            </a:pPr>
+            <a:r>
+              <a:rPr lang="en-US" dirty="0"/>
+              <a:t>Evaluation:</a:t>
+            </a:r>
+          </a:p>
+          <a:p>
+            <a:pPr marL="685800" lvl="1" indent="-342900">
+              <a:buFont typeface="Arial" panose="020B0604020202020204" pitchFamily="34" charset="0"/>
+              <a:buChar char="•"/>
+            </a:pPr>
+            <a:r>
+              <a:rPr lang="en-US" dirty="0" err="1"/>
+              <a:t>HectorSLAM</a:t>
+            </a:r>
+            <a:r>
+              <a:rPr lang="en-US" b="0" dirty="0"/>
+              <a:t> Lidar data are treated as ground truth.</a:t>
+            </a:r>
+          </a:p>
+          <a:p>
+            <a:pPr marL="685800" lvl="1" indent="-342900">
+              <a:buFont typeface="Arial" panose="020B0604020202020204" pitchFamily="34" charset="0"/>
+              <a:buChar char="•"/>
+            </a:pPr>
+            <a:r>
+              <a:rPr lang="en-US" dirty="0"/>
+              <a:t>Max. and Avg. deviation </a:t>
+            </a:r>
+            <a:r>
+              <a:rPr lang="en-US" b="0" dirty="0"/>
+              <a:t>of trajectory was used as performance metric.</a:t>
+            </a:r>
+          </a:p>
+          <a:p>
+            <a:pPr marL="342900" indent="-342900">
+              <a:buFont typeface="Arial" panose="020B0604020202020204" pitchFamily="34" charset="0"/>
+              <a:buChar char="•"/>
+            </a:pPr>
+            <a:endParaRPr lang="en-US" b="0" dirty="0"/>
+          </a:p>
+          <a:p>
+            <a:pPr marL="342900" indent="-342900">
+              <a:buFont typeface="Arial" panose="020B0604020202020204" pitchFamily="34" charset="0"/>
+              <a:buChar char="•"/>
+            </a:pPr>
+            <a:endParaRPr lang="en-US" b="0" dirty="0"/>
           </a:p>
         </p:txBody>
       </p:sp>
@@ -13908,7 +15604,7 @@
           <p:cNvPr id="3" name="Title 2">
             <a:extLst>
               <a:ext uri="{FF2B5EF4-FFF2-40B4-BE49-F238E27FC236}">
-                <a16:creationId xmlns:a16="http://schemas.microsoft.com/office/drawing/2014/main" id="{FA6164BB-0384-4AA7-A10B-34C6FA615FBC}"/>
+                <a16:creationId xmlns:a16="http://schemas.microsoft.com/office/drawing/2014/main" id="{C0FDF4FF-2BE5-44B4-8A65-D68F78B61F93}"/>
               </a:ext>
             </a:extLst>
           </p:cNvPr>
@@ -13926,50 +15622,65 @@
           <a:p>
             <a:r>
               <a:rPr lang="en-US" dirty="0"/>
-              <a:t>System Block Diagram: </a:t>
-            </a:r>
-            <a:r>
-              <a:rPr lang="en-US" b="0" dirty="0"/>
-              <a:t>Abstract</a:t>
-            </a:r>
-            <a:endParaRPr lang="en-US" dirty="0"/>
+              <a:t>RTAB-Map Vs. ORB-SLAM2</a:t>
+            </a:r>
           </a:p>
         </p:txBody>
       </p:sp>
-      <p:pic>
-        <p:nvPicPr>
-          <p:cNvPr id="5" name="Picture 4">
+      <p:sp>
+        <p:nvSpPr>
+          <p:cNvPr id="4" name="Rectangle 3">
             <a:extLst>
               <a:ext uri="{FF2B5EF4-FFF2-40B4-BE49-F238E27FC236}">
-                <a16:creationId xmlns:a16="http://schemas.microsoft.com/office/drawing/2014/main" id="{A6E1A9E5-3025-4E18-903B-545394D28264}"/>
+                <a16:creationId xmlns:a16="http://schemas.microsoft.com/office/drawing/2014/main" id="{0AC0F7B7-95E3-4276-87F0-05D77841CD7C}"/>
               </a:ext>
             </a:extLst>
           </p:cNvPr>
-          <p:cNvPicPr>
-            <a:picLocks noChangeAspect="1"/>
-          </p:cNvPicPr>
+          <p:cNvSpPr/>
           <p:nvPr/>
-        </p:nvPicPr>
-        <p:blipFill>
-          <a:blip r:embed="rId2"/>
-          <a:stretch>
-            <a:fillRect/>
-          </a:stretch>
-        </p:blipFill>
+        </p:nvSpPr>
         <p:spPr>
           <a:xfrm>
-            <a:off x="0" y="3564922"/>
-            <a:ext cx="9144000" cy="3055556"/>
+            <a:off x="814388" y="950837"/>
+            <a:ext cx="7562850" cy="646331"/>
           </a:xfrm>
           <a:prstGeom prst="rect">
             <a:avLst/>
           </a:prstGeom>
         </p:spPr>
-      </p:pic>
+        <p:txBody>
+          <a:bodyPr wrap="square">
+            <a:spAutoFit/>
+          </a:bodyPr>
+          <a:lstStyle/>
+          <a:p>
+            <a:pPr algn="ctr"/>
+            <a:r>
+              <a:rPr lang="en-US" sz="1800" b="1" dirty="0">
+                <a:solidFill>
+                  <a:srgbClr val="00B050"/>
+                </a:solidFill>
+              </a:rPr>
+              <a:t>Comparison of ROS-based Visual SLAM methods in </a:t>
+            </a:r>
+          </a:p>
+          <a:p>
+            <a:pPr algn="ctr"/>
+            <a:r>
+              <a:rPr lang="en-US" sz="1800" b="1" dirty="0">
+                <a:solidFill>
+                  <a:srgbClr val="00B050"/>
+                </a:solidFill>
+              </a:rPr>
+              <a:t>homogeneous indoor environment </a:t>
+            </a:r>
+          </a:p>
+        </p:txBody>
+      </p:sp>
     </p:spTree>
     <p:extLst>
       <p:ext uri="{BB962C8B-B14F-4D97-AF65-F5344CB8AC3E}">
-        <p14:creationId xmlns:p14="http://schemas.microsoft.com/office/powerpoint/2010/main" val="3357442110"/>
+        <p14:creationId xmlns:p14="http://schemas.microsoft.com/office/powerpoint/2010/main" val="1032680570"/>
       </p:ext>
     </p:extLst>
   </p:cSld>
@@ -13998,10 +15709,46 @@
       </p:grpSpPr>
       <p:sp>
         <p:nvSpPr>
+          <p:cNvPr id="2" name="Text Placeholder 1">
+            <a:extLst>
+              <a:ext uri="{FF2B5EF4-FFF2-40B4-BE49-F238E27FC236}">
+                <a16:creationId xmlns:a16="http://schemas.microsoft.com/office/drawing/2014/main" id="{D72E0B0E-2E5F-4BB3-95A9-40BD5F1F3929}"/>
+              </a:ext>
+            </a:extLst>
+          </p:cNvPr>
+          <p:cNvSpPr>
+            <a:spLocks noGrp="1"/>
+          </p:cNvSpPr>
+          <p:nvPr>
+            <p:ph type="body" sz="quarter" idx="16"/>
+          </p:nvPr>
+        </p:nvSpPr>
+        <p:spPr/>
+        <p:txBody>
+          <a:bodyPr/>
+          <a:lstStyle/>
+          <a:p>
+            <a:pPr marL="342900" indent="-342900">
+              <a:buFont typeface="Arial" panose="020B0604020202020204" pitchFamily="34" charset="0"/>
+              <a:buChar char="•"/>
+            </a:pPr>
+            <a:endParaRPr lang="en-US" b="0" dirty="0"/>
+          </a:p>
+          <a:p>
+            <a:pPr marL="342900" indent="-342900">
+              <a:buFont typeface="Arial" panose="020B0604020202020204" pitchFamily="34" charset="0"/>
+              <a:buChar char="•"/>
+            </a:pPr>
+            <a:endParaRPr lang="en-US" b="0" dirty="0"/>
+          </a:p>
+        </p:txBody>
+      </p:sp>
+      <p:sp>
+        <p:nvSpPr>
           <p:cNvPr id="3" name="Title 2">
             <a:extLst>
               <a:ext uri="{FF2B5EF4-FFF2-40B4-BE49-F238E27FC236}">
-                <a16:creationId xmlns:a16="http://schemas.microsoft.com/office/drawing/2014/main" id="{0CC138BA-64D3-4572-B81F-AE21E7FCB087}"/>
+                <a16:creationId xmlns:a16="http://schemas.microsoft.com/office/drawing/2014/main" id="{C0FDF4FF-2BE5-44B4-8A65-D68F78B61F93}"/>
               </a:ext>
             </a:extLst>
           </p:cNvPr>
@@ -14019,13 +15766,58 @@
           <a:p>
             <a:r>
               <a:rPr lang="en-US" dirty="0"/>
-              <a:t>System Block Diagram: </a:t>
-            </a:r>
-            <a:r>
-              <a:rPr lang="en-US" b="0" dirty="0"/>
-              <a:t>Detailed</a:t>
-            </a:r>
-            <a:endParaRPr lang="en-US" dirty="0"/>
+              <a:t>RTAB-Map Vs. ORB-SLAM2</a:t>
+            </a:r>
+          </a:p>
+        </p:txBody>
+      </p:sp>
+      <p:sp>
+        <p:nvSpPr>
+          <p:cNvPr id="4" name="Rectangle 3">
+            <a:extLst>
+              <a:ext uri="{FF2B5EF4-FFF2-40B4-BE49-F238E27FC236}">
+                <a16:creationId xmlns:a16="http://schemas.microsoft.com/office/drawing/2014/main" id="{0AC0F7B7-95E3-4276-87F0-05D77841CD7C}"/>
+              </a:ext>
+            </a:extLst>
+          </p:cNvPr>
+          <p:cNvSpPr/>
+          <p:nvPr/>
+        </p:nvSpPr>
+        <p:spPr>
+          <a:xfrm>
+            <a:off x="814388" y="950837"/>
+            <a:ext cx="7562850" cy="646331"/>
+          </a:xfrm>
+          <a:prstGeom prst="rect">
+            <a:avLst/>
+          </a:prstGeom>
+        </p:spPr>
+        <p:txBody>
+          <a:bodyPr wrap="square">
+            <a:spAutoFit/>
+          </a:bodyPr>
+          <a:lstStyle/>
+          <a:p>
+            <a:pPr algn="ctr"/>
+            <a:r>
+              <a:rPr lang="en-US" sz="1800" b="1" dirty="0">
+                <a:solidFill>
+                  <a:srgbClr val="00B050"/>
+                </a:solidFill>
+              </a:rPr>
+              <a:t>Comparison of ROS-based Visual SLAM methods in </a:t>
+            </a:r>
+          </a:p>
+          <a:p>
+            <a:pPr algn="ctr"/>
+            <a:r>
+              <a:rPr lang="en-US" sz="1800" b="1" dirty="0">
+                <a:solidFill>
+                  <a:srgbClr val="00B050"/>
+                </a:solidFill>
+              </a:rPr>
+              <a:t>homogeneous indoor environment </a:t>
+            </a:r>
           </a:p>
         </p:txBody>
       </p:sp>
@@ -14034,7 +15826,7 @@
           <p:cNvPr id="5" name="Picture 4">
             <a:extLst>
               <a:ext uri="{FF2B5EF4-FFF2-40B4-BE49-F238E27FC236}">
-                <a16:creationId xmlns:a16="http://schemas.microsoft.com/office/drawing/2014/main" id="{F6E64E13-C1E8-4A63-8A14-5CAB3C77175E}"/>
+                <a16:creationId xmlns:a16="http://schemas.microsoft.com/office/drawing/2014/main" id="{0BCC3496-DEDD-45F4-BE8F-98FA694C8315}"/>
               </a:ext>
             </a:extLst>
           </p:cNvPr>
@@ -14051,8 +15843,68 @@
         </p:blipFill>
         <p:spPr>
           <a:xfrm>
-            <a:off x="0" y="1376093"/>
-            <a:ext cx="9144000" cy="5084618"/>
+            <a:off x="1062143" y="1650919"/>
+            <a:ext cx="3456241" cy="2449994"/>
+          </a:xfrm>
+          <a:prstGeom prst="rect">
+            <a:avLst/>
+          </a:prstGeom>
+        </p:spPr>
+      </p:pic>
+      <p:pic>
+        <p:nvPicPr>
+          <p:cNvPr id="6" name="Picture 5">
+            <a:extLst>
+              <a:ext uri="{FF2B5EF4-FFF2-40B4-BE49-F238E27FC236}">
+                <a16:creationId xmlns:a16="http://schemas.microsoft.com/office/drawing/2014/main" id="{DBBA3C06-6019-4158-8EB7-9E7AFDE6F224}"/>
+              </a:ext>
+            </a:extLst>
+          </p:cNvPr>
+          <p:cNvPicPr>
+            <a:picLocks noChangeAspect="1"/>
+          </p:cNvPicPr>
+          <p:nvPr/>
+        </p:nvPicPr>
+        <p:blipFill>
+          <a:blip r:embed="rId3"/>
+          <a:stretch>
+            <a:fillRect/>
+          </a:stretch>
+        </p:blipFill>
+        <p:spPr>
+          <a:xfrm>
+            <a:off x="4793848" y="1608667"/>
+            <a:ext cx="3583390" cy="2522999"/>
+          </a:xfrm>
+          <a:prstGeom prst="rect">
+            <a:avLst/>
+          </a:prstGeom>
+        </p:spPr>
+      </p:pic>
+      <p:pic>
+        <p:nvPicPr>
+          <p:cNvPr id="7" name="Picture 6">
+            <a:extLst>
+              <a:ext uri="{FF2B5EF4-FFF2-40B4-BE49-F238E27FC236}">
+                <a16:creationId xmlns:a16="http://schemas.microsoft.com/office/drawing/2014/main" id="{C372F53B-46BD-438D-9A2F-22CBF7D42434}"/>
+              </a:ext>
+            </a:extLst>
+          </p:cNvPr>
+          <p:cNvPicPr>
+            <a:picLocks noChangeAspect="1"/>
+          </p:cNvPicPr>
+          <p:nvPr/>
+        </p:nvPicPr>
+        <p:blipFill>
+          <a:blip r:embed="rId4"/>
+          <a:stretch>
+            <a:fillRect/>
+          </a:stretch>
+        </p:blipFill>
+        <p:spPr>
+          <a:xfrm>
+            <a:off x="2625831" y="4143165"/>
+            <a:ext cx="3785106" cy="2714835"/>
           </a:xfrm>
           <a:prstGeom prst="rect">
             <a:avLst/>
@@ -14062,7 +15914,7 @@
     </p:spTree>
     <p:extLst>
       <p:ext uri="{BB962C8B-B14F-4D97-AF65-F5344CB8AC3E}">
-        <p14:creationId xmlns:p14="http://schemas.microsoft.com/office/powerpoint/2010/main" val="1106994731"/>
+        <p14:creationId xmlns:p14="http://schemas.microsoft.com/office/powerpoint/2010/main" val="3836555453"/>
       </p:ext>
     </p:extLst>
   </p:cSld>

</xml_diff>

<commit_message>
submit final version of pres. 2
</commit_message>
<xml_diff>
--- a/Presentation_2/CMPUT631-ProjectProgress-V0P1.pptx
+++ b/Presentation_2/CMPUT631-ProjectProgress-V0P1.pptx
@@ -9340,13 +9340,8 @@
             </a:pPr>
             <a:r>
               <a:rPr lang="en-US" b="0" dirty="0"/>
-              <a:t>RTAB-Map is dependent on the environment and can suffer empty space anomalies in indoor environments</a:t>
-            </a:r>
-            <a:r>
-              <a:rPr lang="en-US" b="0"/>
-              <a:t>.  </a:t>
-            </a:r>
-            <a:endParaRPr lang="en-US" b="0" dirty="0"/>
+              <a:t>RTAB-Map is dependent on the environment and can suffer empty space anomalies in indoor environments.  </a:t>
+            </a:r>
           </a:p>
           <a:p>
             <a:pPr marL="342900" indent="-342900">

</xml_diff>